<commit_message>
docs: updated docker article
</commit_message>
<xml_diff>
--- a/kkraman02_github_io_ppt.pptx
+++ b/kkraman02_github_io_ppt.pptx
@@ -104,6 +104,11 @@
       </a:defRPr>
     </a:lvl9pPr>
   </p:defaultTextStyle>
+  <p:extLst>
+    <p:ext uri="{EFAFB233-063F-42B5-8137-9DF3F51BA10A}">
+      <p15:sldGuideLst xmlns:p15="http://schemas.microsoft.com/office/powerpoint/2012/main"/>
+    </p:ext>
+  </p:extLst>
 </p:presentation>
 </file>
 
@@ -256,7 +261,7 @@
           <a:p>
             <a:fld id="{133A8F66-8746-1246-B91D-4C57C954E106}" type="datetimeFigureOut">
               <a:rPr lang="en-TW" smtClean="0"/>
-              <a:t>2025/1/15</a:t>
+              <a:t>2025/2/3</a:t>
             </a:fld>
             <a:endParaRPr lang="en-TW"/>
           </a:p>
@@ -456,7 +461,7 @@
           <a:p>
             <a:fld id="{133A8F66-8746-1246-B91D-4C57C954E106}" type="datetimeFigureOut">
               <a:rPr lang="en-TW" smtClean="0"/>
-              <a:t>2025/1/15</a:t>
+              <a:t>2025/2/3</a:t>
             </a:fld>
             <a:endParaRPr lang="en-TW"/>
           </a:p>
@@ -666,7 +671,7 @@
           <a:p>
             <a:fld id="{133A8F66-8746-1246-B91D-4C57C954E106}" type="datetimeFigureOut">
               <a:rPr lang="en-TW" smtClean="0"/>
-              <a:t>2025/1/15</a:t>
+              <a:t>2025/2/3</a:t>
             </a:fld>
             <a:endParaRPr lang="en-TW"/>
           </a:p>
@@ -866,7 +871,7 @@
           <a:p>
             <a:fld id="{133A8F66-8746-1246-B91D-4C57C954E106}" type="datetimeFigureOut">
               <a:rPr lang="en-TW" smtClean="0"/>
-              <a:t>2025/1/15</a:t>
+              <a:t>2025/2/3</a:t>
             </a:fld>
             <a:endParaRPr lang="en-TW"/>
           </a:p>
@@ -1142,7 +1147,7 @@
           <a:p>
             <a:fld id="{133A8F66-8746-1246-B91D-4C57C954E106}" type="datetimeFigureOut">
               <a:rPr lang="en-TW" smtClean="0"/>
-              <a:t>2025/1/15</a:t>
+              <a:t>2025/2/3</a:t>
             </a:fld>
             <a:endParaRPr lang="en-TW"/>
           </a:p>
@@ -1410,7 +1415,7 @@
           <a:p>
             <a:fld id="{133A8F66-8746-1246-B91D-4C57C954E106}" type="datetimeFigureOut">
               <a:rPr lang="en-TW" smtClean="0"/>
-              <a:t>2025/1/15</a:t>
+              <a:t>2025/2/3</a:t>
             </a:fld>
             <a:endParaRPr lang="en-TW"/>
           </a:p>
@@ -1825,7 +1830,7 @@
           <a:p>
             <a:fld id="{133A8F66-8746-1246-B91D-4C57C954E106}" type="datetimeFigureOut">
               <a:rPr lang="en-TW" smtClean="0"/>
-              <a:t>2025/1/15</a:t>
+              <a:t>2025/2/3</a:t>
             </a:fld>
             <a:endParaRPr lang="en-TW"/>
           </a:p>
@@ -1967,7 +1972,7 @@
           <a:p>
             <a:fld id="{133A8F66-8746-1246-B91D-4C57C954E106}" type="datetimeFigureOut">
               <a:rPr lang="en-TW" smtClean="0"/>
-              <a:t>2025/1/15</a:t>
+              <a:t>2025/2/3</a:t>
             </a:fld>
             <a:endParaRPr lang="en-TW"/>
           </a:p>
@@ -2080,7 +2085,7 @@
           <a:p>
             <a:fld id="{133A8F66-8746-1246-B91D-4C57C954E106}" type="datetimeFigureOut">
               <a:rPr lang="en-TW" smtClean="0"/>
-              <a:t>2025/1/15</a:t>
+              <a:t>2025/2/3</a:t>
             </a:fld>
             <a:endParaRPr lang="en-TW"/>
           </a:p>
@@ -2393,7 +2398,7 @@
           <a:p>
             <a:fld id="{133A8F66-8746-1246-B91D-4C57C954E106}" type="datetimeFigureOut">
               <a:rPr lang="en-TW" smtClean="0"/>
-              <a:t>2025/1/15</a:t>
+              <a:t>2025/2/3</a:t>
             </a:fld>
             <a:endParaRPr lang="en-TW"/>
           </a:p>
@@ -2682,7 +2687,7 @@
           <a:p>
             <a:fld id="{133A8F66-8746-1246-B91D-4C57C954E106}" type="datetimeFigureOut">
               <a:rPr lang="en-TW" smtClean="0"/>
-              <a:t>2025/1/15</a:t>
+              <a:t>2025/2/3</a:t>
             </a:fld>
             <a:endParaRPr lang="en-TW"/>
           </a:p>
@@ -2925,7 +2930,7 @@
           <a:p>
             <a:fld id="{133A8F66-8746-1246-B91D-4C57C954E106}" type="datetimeFigureOut">
               <a:rPr lang="en-TW" smtClean="0"/>
-              <a:t>2025/1/15</a:t>
+              <a:t>2025/2/3</a:t>
             </a:fld>
             <a:endParaRPr lang="en-TW"/>
           </a:p>
@@ -3344,39 +3349,648 @@
       </p:grpSpPr>
       <p:sp>
         <p:nvSpPr>
-          <p:cNvPr id="4" name="TextBox 3">
-            <a:extLst>
-              <a:ext uri="{FF2B5EF4-FFF2-40B4-BE49-F238E27FC236}">
-                <a16:creationId xmlns:a16="http://schemas.microsoft.com/office/drawing/2014/main" id="{12D83160-636B-415E-985E-610453E3865B}"/>
-              </a:ext>
-            </a:extLst>
-          </p:cNvPr>
-          <p:cNvSpPr txBox="1"/>
+          <p:cNvPr id="2" name="Rounded Rectangle 1">
+            <a:extLst>
+              <a:ext uri="{FF2B5EF4-FFF2-40B4-BE49-F238E27FC236}">
+                <a16:creationId xmlns:a16="http://schemas.microsoft.com/office/drawing/2014/main" id="{98C8DAAD-D781-D6F9-C6A6-F305E65E2275}"/>
+              </a:ext>
+            </a:extLst>
+          </p:cNvPr>
+          <p:cNvSpPr/>
           <p:nvPr/>
         </p:nvSpPr>
         <p:spPr>
           <a:xfrm>
-            <a:off x="5223325" y="330506"/>
-            <a:ext cx="1745350" cy="369332"/>
+            <a:off x="3580692" y="2955776"/>
+            <a:ext cx="820395" cy="946447"/>
           </a:xfrm>
-          <a:prstGeom prst="rect">
+          <a:prstGeom prst="roundRect">
             <a:avLst/>
           </a:prstGeom>
-          <a:noFill/>
         </p:spPr>
-        <p:txBody>
-          <a:bodyPr wrap="none" rtlCol="0">
-            <a:spAutoFit/>
-          </a:bodyPr>
-          <a:lstStyle/>
-          <a:p>
-            <a:r>
-              <a:rPr lang="en-TW" dirty="0"/>
-              <a:t>Linux Boot Flow</a:t>
-            </a:r>
-          </a:p>
-        </p:txBody>
-      </p:sp>
+        <p:style>
+          <a:lnRef idx="2">
+            <a:schemeClr val="dk1"/>
+          </a:lnRef>
+          <a:fillRef idx="1">
+            <a:schemeClr val="lt1"/>
+          </a:fillRef>
+          <a:effectRef idx="0">
+            <a:schemeClr val="dk1"/>
+          </a:effectRef>
+          <a:fontRef idx="minor">
+            <a:schemeClr val="dk1"/>
+          </a:fontRef>
+        </p:style>
+        <p:txBody>
+          <a:bodyPr rtlCol="0" anchor="ctr"/>
+          <a:lstStyle/>
+          <a:p>
+            <a:pPr algn="ctr"/>
+            <a:r>
+              <a:rPr lang="en-TW" sz="800" dirty="0"/>
+              <a:t>Container- 1</a:t>
+            </a:r>
+          </a:p>
+        </p:txBody>
+      </p:sp>
+      <p:sp>
+        <p:nvSpPr>
+          <p:cNvPr id="3" name="Rounded Rectangle 2">
+            <a:extLst>
+              <a:ext uri="{FF2B5EF4-FFF2-40B4-BE49-F238E27FC236}">
+                <a16:creationId xmlns:a16="http://schemas.microsoft.com/office/drawing/2014/main" id="{95348C8E-FFEC-51FF-6E0F-9E0767ECF04A}"/>
+              </a:ext>
+            </a:extLst>
+          </p:cNvPr>
+          <p:cNvSpPr/>
+          <p:nvPr/>
+        </p:nvSpPr>
+        <p:spPr>
+          <a:xfrm>
+            <a:off x="4401087" y="2955775"/>
+            <a:ext cx="820395" cy="946447"/>
+          </a:xfrm>
+          <a:prstGeom prst="roundRect">
+            <a:avLst/>
+          </a:prstGeom>
+        </p:spPr>
+        <p:style>
+          <a:lnRef idx="2">
+            <a:schemeClr val="dk1"/>
+          </a:lnRef>
+          <a:fillRef idx="1">
+            <a:schemeClr val="lt1"/>
+          </a:fillRef>
+          <a:effectRef idx="0">
+            <a:schemeClr val="dk1"/>
+          </a:effectRef>
+          <a:fontRef idx="minor">
+            <a:schemeClr val="dk1"/>
+          </a:fontRef>
+        </p:style>
+        <p:txBody>
+          <a:bodyPr rtlCol="0" anchor="ctr"/>
+          <a:lstStyle/>
+          <a:p>
+            <a:pPr algn="ctr"/>
+            <a:r>
+              <a:rPr lang="en-TW" sz="800" dirty="0"/>
+              <a:t>Container- 1</a:t>
+            </a:r>
+          </a:p>
+        </p:txBody>
+      </p:sp>
+      <p:sp>
+        <p:nvSpPr>
+          <p:cNvPr id="5" name="Rounded Rectangle 4">
+            <a:extLst>
+              <a:ext uri="{FF2B5EF4-FFF2-40B4-BE49-F238E27FC236}">
+                <a16:creationId xmlns:a16="http://schemas.microsoft.com/office/drawing/2014/main" id="{1F3E658C-B163-11F4-E6A7-1B87A947E791}"/>
+              </a:ext>
+            </a:extLst>
+          </p:cNvPr>
+          <p:cNvSpPr/>
+          <p:nvPr/>
+        </p:nvSpPr>
+        <p:spPr>
+          <a:xfrm>
+            <a:off x="6433553" y="2955775"/>
+            <a:ext cx="820395" cy="946447"/>
+          </a:xfrm>
+          <a:prstGeom prst="roundRect">
+            <a:avLst/>
+          </a:prstGeom>
+        </p:spPr>
+        <p:style>
+          <a:lnRef idx="2">
+            <a:schemeClr val="dk1"/>
+          </a:lnRef>
+          <a:fillRef idx="1">
+            <a:schemeClr val="lt1"/>
+          </a:fillRef>
+          <a:effectRef idx="0">
+            <a:schemeClr val="dk1"/>
+          </a:effectRef>
+          <a:fontRef idx="minor">
+            <a:schemeClr val="dk1"/>
+          </a:fontRef>
+        </p:style>
+        <p:txBody>
+          <a:bodyPr rtlCol="0" anchor="ctr"/>
+          <a:lstStyle/>
+          <a:p>
+            <a:pPr algn="ctr"/>
+            <a:r>
+              <a:rPr lang="en-TW" sz="800" dirty="0"/>
+              <a:t>Hub</a:t>
+            </a:r>
+          </a:p>
+          <a:p>
+            <a:pPr algn="ctr"/>
+            <a:r>
+              <a:rPr lang="en-TW" sz="800" dirty="0"/>
+              <a:t>(Registry)</a:t>
+            </a:r>
+          </a:p>
+        </p:txBody>
+      </p:sp>
+      <p:sp>
+        <p:nvSpPr>
+          <p:cNvPr id="6" name="Rounded Rectangle 5">
+            <a:extLst>
+              <a:ext uri="{FF2B5EF4-FFF2-40B4-BE49-F238E27FC236}">
+                <a16:creationId xmlns:a16="http://schemas.microsoft.com/office/drawing/2014/main" id="{AE8CD56F-2F21-CE30-17F4-98D4A4D838DD}"/>
+              </a:ext>
+            </a:extLst>
+          </p:cNvPr>
+          <p:cNvSpPr/>
+          <p:nvPr/>
+        </p:nvSpPr>
+        <p:spPr>
+          <a:xfrm>
+            <a:off x="3580692" y="2385880"/>
+            <a:ext cx="820395" cy="379930"/>
+          </a:xfrm>
+          <a:prstGeom prst="roundRect">
+            <a:avLst/>
+          </a:prstGeom>
+        </p:spPr>
+        <p:style>
+          <a:lnRef idx="2">
+            <a:schemeClr val="dk1"/>
+          </a:lnRef>
+          <a:fillRef idx="1">
+            <a:schemeClr val="lt1"/>
+          </a:fillRef>
+          <a:effectRef idx="0">
+            <a:schemeClr val="dk1"/>
+          </a:effectRef>
+          <a:fontRef idx="minor">
+            <a:schemeClr val="dk1"/>
+          </a:fontRef>
+        </p:style>
+        <p:txBody>
+          <a:bodyPr rtlCol="0" anchor="ctr"/>
+          <a:lstStyle/>
+          <a:p>
+            <a:pPr algn="ctr"/>
+            <a:r>
+              <a:rPr lang="en-TW" sz="800" dirty="0"/>
+              <a:t>Image - 1</a:t>
+            </a:r>
+          </a:p>
+        </p:txBody>
+      </p:sp>
+      <p:sp>
+        <p:nvSpPr>
+          <p:cNvPr id="7" name="Rounded Rectangle 6">
+            <a:extLst>
+              <a:ext uri="{FF2B5EF4-FFF2-40B4-BE49-F238E27FC236}">
+                <a16:creationId xmlns:a16="http://schemas.microsoft.com/office/drawing/2014/main" id="{B1712C30-95F4-DA84-02B3-9CEDA2221A71}"/>
+              </a:ext>
+            </a:extLst>
+          </p:cNvPr>
+          <p:cNvSpPr/>
+          <p:nvPr/>
+        </p:nvSpPr>
+        <p:spPr>
+          <a:xfrm>
+            <a:off x="4401086" y="2385880"/>
+            <a:ext cx="820395" cy="379930"/>
+          </a:xfrm>
+          <a:prstGeom prst="roundRect">
+            <a:avLst/>
+          </a:prstGeom>
+        </p:spPr>
+        <p:style>
+          <a:lnRef idx="2">
+            <a:schemeClr val="dk1"/>
+          </a:lnRef>
+          <a:fillRef idx="1">
+            <a:schemeClr val="lt1"/>
+          </a:fillRef>
+          <a:effectRef idx="0">
+            <a:schemeClr val="dk1"/>
+          </a:effectRef>
+          <a:fontRef idx="minor">
+            <a:schemeClr val="dk1"/>
+          </a:fontRef>
+        </p:style>
+        <p:txBody>
+          <a:bodyPr rtlCol="0" anchor="ctr"/>
+          <a:lstStyle/>
+          <a:p>
+            <a:pPr algn="ctr"/>
+            <a:r>
+              <a:rPr lang="en-TW" sz="800" dirty="0"/>
+              <a:t>Image - 2</a:t>
+            </a:r>
+          </a:p>
+        </p:txBody>
+      </p:sp>
+      <p:sp>
+        <p:nvSpPr>
+          <p:cNvPr id="8" name="Rounded Rectangle 7">
+            <a:extLst>
+              <a:ext uri="{FF2B5EF4-FFF2-40B4-BE49-F238E27FC236}">
+                <a16:creationId xmlns:a16="http://schemas.microsoft.com/office/drawing/2014/main" id="{4F08DBFB-32F2-C274-0B54-30E8D335E513}"/>
+              </a:ext>
+            </a:extLst>
+          </p:cNvPr>
+          <p:cNvSpPr/>
+          <p:nvPr/>
+        </p:nvSpPr>
+        <p:spPr>
+          <a:xfrm>
+            <a:off x="6433553" y="2385880"/>
+            <a:ext cx="820395" cy="379930"/>
+          </a:xfrm>
+          <a:prstGeom prst="roundRect">
+            <a:avLst/>
+          </a:prstGeom>
+        </p:spPr>
+        <p:style>
+          <a:lnRef idx="2">
+            <a:schemeClr val="dk1"/>
+          </a:lnRef>
+          <a:fillRef idx="1">
+            <a:schemeClr val="lt1"/>
+          </a:fillRef>
+          <a:effectRef idx="0">
+            <a:schemeClr val="dk1"/>
+          </a:effectRef>
+          <a:fontRef idx="minor">
+            <a:schemeClr val="dk1"/>
+          </a:fontRef>
+        </p:style>
+        <p:txBody>
+          <a:bodyPr rtlCol="0" anchor="ctr"/>
+          <a:lstStyle/>
+          <a:p>
+            <a:pPr algn="ctr"/>
+            <a:r>
+              <a:rPr lang="en-TW" sz="800" dirty="0"/>
+              <a:t>Images</a:t>
+            </a:r>
+          </a:p>
+        </p:txBody>
+      </p:sp>
+      <p:cxnSp>
+        <p:nvCxnSpPr>
+          <p:cNvPr id="11" name="Curved Connector 10">
+            <a:extLst>
+              <a:ext uri="{FF2B5EF4-FFF2-40B4-BE49-F238E27FC236}">
+                <a16:creationId xmlns:a16="http://schemas.microsoft.com/office/drawing/2014/main" id="{9FD51E37-0327-B7B5-6EA1-5DBEC9162F5B}"/>
+              </a:ext>
+            </a:extLst>
+          </p:cNvPr>
+          <p:cNvCxnSpPr>
+            <a:cxnSpLocks/>
+            <a:stCxn id="8" idx="0"/>
+            <a:endCxn id="6" idx="0"/>
+          </p:cNvCxnSpPr>
+          <p:nvPr/>
+        </p:nvCxnSpPr>
+        <p:spPr>
+          <a:xfrm rot="16200000" flipV="1">
+            <a:off x="5417321" y="959449"/>
+            <a:ext cx="12700" cy="2852861"/>
+          </a:xfrm>
+          <a:prstGeom prst="curvedConnector3">
+            <a:avLst>
+              <a:gd name="adj1" fmla="val 1800000"/>
+            </a:avLst>
+          </a:prstGeom>
+          <a:ln>
+            <a:tailEnd type="triangle"/>
+          </a:ln>
+        </p:spPr>
+        <p:style>
+          <a:lnRef idx="2">
+            <a:schemeClr val="dk1"/>
+          </a:lnRef>
+          <a:fillRef idx="1">
+            <a:schemeClr val="lt1"/>
+          </a:fillRef>
+          <a:effectRef idx="0">
+            <a:schemeClr val="dk1"/>
+          </a:effectRef>
+          <a:fontRef idx="minor">
+            <a:schemeClr val="dk1"/>
+          </a:fontRef>
+        </p:style>
+      </p:cxnSp>
+      <p:cxnSp>
+        <p:nvCxnSpPr>
+          <p:cNvPr id="30" name="Curved Connector 29">
+            <a:extLst>
+              <a:ext uri="{FF2B5EF4-FFF2-40B4-BE49-F238E27FC236}">
+                <a16:creationId xmlns:a16="http://schemas.microsoft.com/office/drawing/2014/main" id="{B7E457A6-FB60-2319-6B24-50921385011D}"/>
+              </a:ext>
+            </a:extLst>
+          </p:cNvPr>
+          <p:cNvCxnSpPr>
+            <a:cxnSpLocks/>
+            <a:stCxn id="8" idx="0"/>
+            <a:endCxn id="7" idx="0"/>
+          </p:cNvCxnSpPr>
+          <p:nvPr/>
+        </p:nvCxnSpPr>
+        <p:spPr>
+          <a:xfrm rot="16200000" flipV="1">
+            <a:off x="5827518" y="1369646"/>
+            <a:ext cx="12700" cy="2032467"/>
+          </a:xfrm>
+          <a:prstGeom prst="curvedConnector3">
+            <a:avLst>
+              <a:gd name="adj1" fmla="val 1463512"/>
+            </a:avLst>
+          </a:prstGeom>
+          <a:ln>
+            <a:tailEnd type="triangle"/>
+          </a:ln>
+        </p:spPr>
+        <p:style>
+          <a:lnRef idx="2">
+            <a:schemeClr val="dk1"/>
+          </a:lnRef>
+          <a:fillRef idx="1">
+            <a:schemeClr val="lt1"/>
+          </a:fillRef>
+          <a:effectRef idx="0">
+            <a:schemeClr val="dk1"/>
+          </a:effectRef>
+          <a:fontRef idx="minor">
+            <a:schemeClr val="dk1"/>
+          </a:fontRef>
+        </p:style>
+      </p:cxnSp>
+      <p:cxnSp>
+        <p:nvCxnSpPr>
+          <p:cNvPr id="35" name="Straight Arrow Connector 34">
+            <a:extLst>
+              <a:ext uri="{FF2B5EF4-FFF2-40B4-BE49-F238E27FC236}">
+                <a16:creationId xmlns:a16="http://schemas.microsoft.com/office/drawing/2014/main" id="{B24028B6-13B6-E3E6-6168-AA5AF1D6EF32}"/>
+              </a:ext>
+            </a:extLst>
+          </p:cNvPr>
+          <p:cNvCxnSpPr>
+            <a:stCxn id="6" idx="2"/>
+            <a:endCxn id="2" idx="0"/>
+          </p:cNvCxnSpPr>
+          <p:nvPr/>
+        </p:nvCxnSpPr>
+        <p:spPr>
+          <a:xfrm>
+            <a:off x="3990890" y="2765810"/>
+            <a:ext cx="0" cy="189966"/>
+          </a:xfrm>
+          <a:prstGeom prst="straightConnector1">
+            <a:avLst/>
+          </a:prstGeom>
+          <a:ln>
+            <a:tailEnd type="triangle"/>
+          </a:ln>
+        </p:spPr>
+        <p:style>
+          <a:lnRef idx="2">
+            <a:schemeClr val="dk1"/>
+          </a:lnRef>
+          <a:fillRef idx="1">
+            <a:schemeClr val="lt1"/>
+          </a:fillRef>
+          <a:effectRef idx="0">
+            <a:schemeClr val="dk1"/>
+          </a:effectRef>
+          <a:fontRef idx="minor">
+            <a:schemeClr val="dk1"/>
+          </a:fontRef>
+        </p:style>
+      </p:cxnSp>
+      <p:cxnSp>
+        <p:nvCxnSpPr>
+          <p:cNvPr id="36" name="Straight Arrow Connector 35">
+            <a:extLst>
+              <a:ext uri="{FF2B5EF4-FFF2-40B4-BE49-F238E27FC236}">
+                <a16:creationId xmlns:a16="http://schemas.microsoft.com/office/drawing/2014/main" id="{2AF22135-69F2-1C9D-D993-88F8B842FC32}"/>
+              </a:ext>
+            </a:extLst>
+          </p:cNvPr>
+          <p:cNvCxnSpPr>
+            <a:cxnSpLocks/>
+            <a:stCxn id="7" idx="2"/>
+            <a:endCxn id="3" idx="0"/>
+          </p:cNvCxnSpPr>
+          <p:nvPr/>
+        </p:nvCxnSpPr>
+        <p:spPr>
+          <a:xfrm>
+            <a:off x="4811284" y="2765810"/>
+            <a:ext cx="1" cy="189965"/>
+          </a:xfrm>
+          <a:prstGeom prst="straightConnector1">
+            <a:avLst/>
+          </a:prstGeom>
+          <a:ln>
+            <a:tailEnd type="triangle"/>
+          </a:ln>
+        </p:spPr>
+        <p:style>
+          <a:lnRef idx="2">
+            <a:schemeClr val="dk1"/>
+          </a:lnRef>
+          <a:fillRef idx="1">
+            <a:schemeClr val="lt1"/>
+          </a:fillRef>
+          <a:effectRef idx="0">
+            <a:schemeClr val="dk1"/>
+          </a:effectRef>
+          <a:fontRef idx="minor">
+            <a:schemeClr val="dk1"/>
+          </a:fontRef>
+        </p:style>
+      </p:cxnSp>
+      <p:cxnSp>
+        <p:nvCxnSpPr>
+          <p:cNvPr id="39" name="Straight Arrow Connector 38">
+            <a:extLst>
+              <a:ext uri="{FF2B5EF4-FFF2-40B4-BE49-F238E27FC236}">
+                <a16:creationId xmlns:a16="http://schemas.microsoft.com/office/drawing/2014/main" id="{C26B7648-69A3-437C-D0F3-4C1E456B36DE}"/>
+              </a:ext>
+            </a:extLst>
+          </p:cNvPr>
+          <p:cNvCxnSpPr>
+            <a:cxnSpLocks/>
+            <a:stCxn id="5" idx="0"/>
+            <a:endCxn id="8" idx="2"/>
+          </p:cNvCxnSpPr>
+          <p:nvPr/>
+        </p:nvCxnSpPr>
+        <p:spPr>
+          <a:xfrm flipV="1">
+            <a:off x="6843751" y="2765810"/>
+            <a:ext cx="0" cy="189965"/>
+          </a:xfrm>
+          <a:prstGeom prst="straightConnector1">
+            <a:avLst/>
+          </a:prstGeom>
+          <a:ln>
+            <a:tailEnd type="triangle"/>
+          </a:ln>
+        </p:spPr>
+        <p:style>
+          <a:lnRef idx="2">
+            <a:schemeClr val="dk1"/>
+          </a:lnRef>
+          <a:fillRef idx="1">
+            <a:schemeClr val="lt1"/>
+          </a:fillRef>
+          <a:effectRef idx="0">
+            <a:schemeClr val="dk1"/>
+          </a:effectRef>
+          <a:fontRef idx="minor">
+            <a:schemeClr val="dk1"/>
+          </a:fontRef>
+        </p:style>
+      </p:cxnSp>
+      <p:sp>
+        <p:nvSpPr>
+          <p:cNvPr id="44" name="Rounded Rectangle 43">
+            <a:extLst>
+              <a:ext uri="{FF2B5EF4-FFF2-40B4-BE49-F238E27FC236}">
+                <a16:creationId xmlns:a16="http://schemas.microsoft.com/office/drawing/2014/main" id="{987B597D-E1C3-6009-60FD-B1FE714DCF93}"/>
+              </a:ext>
+            </a:extLst>
+          </p:cNvPr>
+          <p:cNvSpPr/>
+          <p:nvPr/>
+        </p:nvSpPr>
+        <p:spPr>
+          <a:xfrm>
+            <a:off x="3606330" y="4092187"/>
+            <a:ext cx="1615151" cy="379930"/>
+          </a:xfrm>
+          <a:prstGeom prst="roundRect">
+            <a:avLst/>
+          </a:prstGeom>
+        </p:spPr>
+        <p:style>
+          <a:lnRef idx="2">
+            <a:schemeClr val="dk1"/>
+          </a:lnRef>
+          <a:fillRef idx="1">
+            <a:schemeClr val="lt1"/>
+          </a:fillRef>
+          <a:effectRef idx="0">
+            <a:schemeClr val="dk1"/>
+          </a:effectRef>
+          <a:fontRef idx="minor">
+            <a:schemeClr val="dk1"/>
+          </a:fontRef>
+        </p:style>
+        <p:txBody>
+          <a:bodyPr rtlCol="0" anchor="ctr"/>
+          <a:lstStyle/>
+          <a:p>
+            <a:pPr algn="ctr"/>
+            <a:r>
+              <a:rPr lang="en-TW" sz="800" dirty="0"/>
+              <a:t>Compose</a:t>
+            </a:r>
+          </a:p>
+        </p:txBody>
+      </p:sp>
+      <p:cxnSp>
+        <p:nvCxnSpPr>
+          <p:cNvPr id="48" name="Curved Connector 47">
+            <a:extLst>
+              <a:ext uri="{FF2B5EF4-FFF2-40B4-BE49-F238E27FC236}">
+                <a16:creationId xmlns:a16="http://schemas.microsoft.com/office/drawing/2014/main" id="{751CA2D0-6BEA-FEB9-1CE5-E121F45A470F}"/>
+              </a:ext>
+            </a:extLst>
+          </p:cNvPr>
+          <p:cNvCxnSpPr>
+            <a:cxnSpLocks/>
+            <a:stCxn id="44" idx="1"/>
+            <a:endCxn id="6" idx="1"/>
+          </p:cNvCxnSpPr>
+          <p:nvPr/>
+        </p:nvCxnSpPr>
+        <p:spPr>
+          <a:xfrm rot="10800000">
+            <a:off x="3580692" y="2575846"/>
+            <a:ext cx="25638" cy="1706307"/>
+          </a:xfrm>
+          <a:prstGeom prst="curvedConnector3">
+            <a:avLst>
+              <a:gd name="adj1" fmla="val 991645"/>
+            </a:avLst>
+          </a:prstGeom>
+          <a:ln>
+            <a:prstDash val="dash"/>
+          </a:ln>
+        </p:spPr>
+        <p:style>
+          <a:lnRef idx="1">
+            <a:schemeClr val="dk1"/>
+          </a:lnRef>
+          <a:fillRef idx="0">
+            <a:schemeClr val="dk1"/>
+          </a:fillRef>
+          <a:effectRef idx="0">
+            <a:schemeClr val="dk1"/>
+          </a:effectRef>
+          <a:fontRef idx="minor">
+            <a:schemeClr val="tx1"/>
+          </a:fontRef>
+        </p:style>
+      </p:cxnSp>
+      <p:cxnSp>
+        <p:nvCxnSpPr>
+          <p:cNvPr id="52" name="Curved Connector 51">
+            <a:extLst>
+              <a:ext uri="{FF2B5EF4-FFF2-40B4-BE49-F238E27FC236}">
+                <a16:creationId xmlns:a16="http://schemas.microsoft.com/office/drawing/2014/main" id="{F299692F-9736-2E46-5C9C-31331C48C250}"/>
+              </a:ext>
+            </a:extLst>
+          </p:cNvPr>
+          <p:cNvCxnSpPr>
+            <a:cxnSpLocks/>
+            <a:stCxn id="44" idx="3"/>
+            <a:endCxn id="7" idx="3"/>
+          </p:cNvCxnSpPr>
+          <p:nvPr/>
+        </p:nvCxnSpPr>
+        <p:spPr>
+          <a:xfrm flipV="1">
+            <a:off x="5221481" y="2575845"/>
+            <a:ext cx="12700" cy="1706307"/>
+          </a:xfrm>
+          <a:prstGeom prst="curvedConnector3">
+            <a:avLst>
+              <a:gd name="adj1" fmla="val 1800000"/>
+            </a:avLst>
+          </a:prstGeom>
+          <a:ln>
+            <a:prstDash val="dash"/>
+          </a:ln>
+        </p:spPr>
+        <p:style>
+          <a:lnRef idx="1">
+            <a:schemeClr val="dk1"/>
+          </a:lnRef>
+          <a:fillRef idx="0">
+            <a:schemeClr val="dk1"/>
+          </a:fillRef>
+          <a:effectRef idx="0">
+            <a:schemeClr val="dk1"/>
+          </a:effectRef>
+          <a:fontRef idx="minor">
+            <a:schemeClr val="tx1"/>
+          </a:fontRef>
+        </p:style>
+      </p:cxnSp>
     </p:spTree>
     <p:extLst>
       <p:ext uri="{BB962C8B-B14F-4D97-AF65-F5344CB8AC3E}">

</xml_diff>

<commit_message>
Updating all the local files
</commit_message>
<xml_diff>
--- a/kkraman02_github_io_ppt.pptx
+++ b/kkraman02_github_io_ppt.pptx
@@ -6,6 +6,7 @@
   </p:sldMasterIdLst>
   <p:sldIdLst>
     <p:sldId id="256" r:id="rId2"/>
+    <p:sldId id="257" r:id="rId3"/>
   </p:sldIdLst>
   <p:sldSz cx="12192000" cy="6858000"/>
   <p:notesSz cx="6858000" cy="9144000"/>
@@ -3347,12 +3348,1514 @@
           <a:chExt cx="0" cy="0"/>
         </a:xfrm>
       </p:grpSpPr>
-      <p:sp>
-        <p:nvSpPr>
-          <p:cNvPr id="2" name="Rounded Rectangle 1">
-            <a:extLst>
-              <a:ext uri="{FF2B5EF4-FFF2-40B4-BE49-F238E27FC236}">
-                <a16:creationId xmlns:a16="http://schemas.microsoft.com/office/drawing/2014/main" id="{98C8DAAD-D781-D6F9-C6A6-F305E65E2275}"/>
+      <p:grpSp>
+        <p:nvGrpSpPr>
+          <p:cNvPr id="55" name="Group 54">
+            <a:extLst>
+              <a:ext uri="{FF2B5EF4-FFF2-40B4-BE49-F238E27FC236}">
+                <a16:creationId xmlns:a16="http://schemas.microsoft.com/office/drawing/2014/main" id="{A68DE5FE-4B31-09F7-AE68-00263EFEE24B}"/>
+              </a:ext>
+            </a:extLst>
+          </p:cNvPr>
+          <p:cNvGrpSpPr/>
+          <p:nvPr/>
+        </p:nvGrpSpPr>
+        <p:grpSpPr>
+          <a:xfrm>
+            <a:off x="3580692" y="2379530"/>
+            <a:ext cx="3673256" cy="2092587"/>
+            <a:chOff x="3580692" y="2379530"/>
+            <a:chExt cx="3673256" cy="2092587"/>
+          </a:xfrm>
+        </p:grpSpPr>
+        <p:sp>
+          <p:nvSpPr>
+            <p:cNvPr id="2" name="Rounded Rectangle 1">
+              <a:extLst>
+                <a:ext uri="{FF2B5EF4-FFF2-40B4-BE49-F238E27FC236}">
+                  <a16:creationId xmlns:a16="http://schemas.microsoft.com/office/drawing/2014/main" id="{98C8DAAD-D781-D6F9-C6A6-F305E65E2275}"/>
+                </a:ext>
+              </a:extLst>
+            </p:cNvPr>
+            <p:cNvSpPr/>
+            <p:nvPr/>
+          </p:nvSpPr>
+          <p:spPr>
+            <a:xfrm>
+              <a:off x="3580692" y="2955776"/>
+              <a:ext cx="820395" cy="946447"/>
+            </a:xfrm>
+            <a:prstGeom prst="roundRect">
+              <a:avLst/>
+            </a:prstGeom>
+          </p:spPr>
+          <p:style>
+            <a:lnRef idx="2">
+              <a:schemeClr val="dk1"/>
+            </a:lnRef>
+            <a:fillRef idx="1">
+              <a:schemeClr val="lt1"/>
+            </a:fillRef>
+            <a:effectRef idx="0">
+              <a:schemeClr val="dk1"/>
+            </a:effectRef>
+            <a:fontRef idx="minor">
+              <a:schemeClr val="dk1"/>
+            </a:fontRef>
+          </p:style>
+          <p:txBody>
+            <a:bodyPr rtlCol="0" anchor="ctr"/>
+            <a:lstStyle/>
+            <a:p>
+              <a:pPr algn="ctr"/>
+              <a:r>
+                <a:rPr lang="en-TW" sz="800" dirty="0"/>
+                <a:t>Container- 1</a:t>
+              </a:r>
+            </a:p>
+          </p:txBody>
+        </p:sp>
+        <p:sp>
+          <p:nvSpPr>
+            <p:cNvPr id="3" name="Rounded Rectangle 2">
+              <a:extLst>
+                <a:ext uri="{FF2B5EF4-FFF2-40B4-BE49-F238E27FC236}">
+                  <a16:creationId xmlns:a16="http://schemas.microsoft.com/office/drawing/2014/main" id="{95348C8E-FFEC-51FF-6E0F-9E0767ECF04A}"/>
+                </a:ext>
+              </a:extLst>
+            </p:cNvPr>
+            <p:cNvSpPr/>
+            <p:nvPr/>
+          </p:nvSpPr>
+          <p:spPr>
+            <a:xfrm>
+              <a:off x="4401087" y="2955775"/>
+              <a:ext cx="820395" cy="946447"/>
+            </a:xfrm>
+            <a:prstGeom prst="roundRect">
+              <a:avLst/>
+            </a:prstGeom>
+          </p:spPr>
+          <p:style>
+            <a:lnRef idx="2">
+              <a:schemeClr val="dk1"/>
+            </a:lnRef>
+            <a:fillRef idx="1">
+              <a:schemeClr val="lt1"/>
+            </a:fillRef>
+            <a:effectRef idx="0">
+              <a:schemeClr val="dk1"/>
+            </a:effectRef>
+            <a:fontRef idx="minor">
+              <a:schemeClr val="dk1"/>
+            </a:fontRef>
+          </p:style>
+          <p:txBody>
+            <a:bodyPr rtlCol="0" anchor="ctr"/>
+            <a:lstStyle/>
+            <a:p>
+              <a:pPr algn="ctr"/>
+              <a:r>
+                <a:rPr lang="en-TW" sz="800" dirty="0"/>
+                <a:t>Container- 1</a:t>
+              </a:r>
+            </a:p>
+          </p:txBody>
+        </p:sp>
+        <p:sp>
+          <p:nvSpPr>
+            <p:cNvPr id="5" name="Rounded Rectangle 4">
+              <a:extLst>
+                <a:ext uri="{FF2B5EF4-FFF2-40B4-BE49-F238E27FC236}">
+                  <a16:creationId xmlns:a16="http://schemas.microsoft.com/office/drawing/2014/main" id="{1F3E658C-B163-11F4-E6A7-1B87A947E791}"/>
+                </a:ext>
+              </a:extLst>
+            </p:cNvPr>
+            <p:cNvSpPr/>
+            <p:nvPr/>
+          </p:nvSpPr>
+          <p:spPr>
+            <a:xfrm>
+              <a:off x="6433553" y="2955775"/>
+              <a:ext cx="820395" cy="946447"/>
+            </a:xfrm>
+            <a:prstGeom prst="roundRect">
+              <a:avLst/>
+            </a:prstGeom>
+          </p:spPr>
+          <p:style>
+            <a:lnRef idx="2">
+              <a:schemeClr val="dk1"/>
+            </a:lnRef>
+            <a:fillRef idx="1">
+              <a:schemeClr val="lt1"/>
+            </a:fillRef>
+            <a:effectRef idx="0">
+              <a:schemeClr val="dk1"/>
+            </a:effectRef>
+            <a:fontRef idx="minor">
+              <a:schemeClr val="dk1"/>
+            </a:fontRef>
+          </p:style>
+          <p:txBody>
+            <a:bodyPr rtlCol="0" anchor="ctr"/>
+            <a:lstStyle/>
+            <a:p>
+              <a:pPr algn="ctr"/>
+              <a:r>
+                <a:rPr lang="en-TW" sz="800" dirty="0"/>
+                <a:t>Hub</a:t>
+              </a:r>
+            </a:p>
+            <a:p>
+              <a:pPr algn="ctr"/>
+              <a:r>
+                <a:rPr lang="en-TW" sz="800" dirty="0"/>
+                <a:t>(Registry)</a:t>
+              </a:r>
+            </a:p>
+          </p:txBody>
+        </p:sp>
+        <p:sp>
+          <p:nvSpPr>
+            <p:cNvPr id="6" name="Rounded Rectangle 5">
+              <a:extLst>
+                <a:ext uri="{FF2B5EF4-FFF2-40B4-BE49-F238E27FC236}">
+                  <a16:creationId xmlns:a16="http://schemas.microsoft.com/office/drawing/2014/main" id="{AE8CD56F-2F21-CE30-17F4-98D4A4D838DD}"/>
+                </a:ext>
+              </a:extLst>
+            </p:cNvPr>
+            <p:cNvSpPr/>
+            <p:nvPr/>
+          </p:nvSpPr>
+          <p:spPr>
+            <a:xfrm>
+              <a:off x="3580692" y="2385880"/>
+              <a:ext cx="820395" cy="379930"/>
+            </a:xfrm>
+            <a:prstGeom prst="roundRect">
+              <a:avLst/>
+            </a:prstGeom>
+          </p:spPr>
+          <p:style>
+            <a:lnRef idx="2">
+              <a:schemeClr val="dk1"/>
+            </a:lnRef>
+            <a:fillRef idx="1">
+              <a:schemeClr val="lt1"/>
+            </a:fillRef>
+            <a:effectRef idx="0">
+              <a:schemeClr val="dk1"/>
+            </a:effectRef>
+            <a:fontRef idx="minor">
+              <a:schemeClr val="dk1"/>
+            </a:fontRef>
+          </p:style>
+          <p:txBody>
+            <a:bodyPr rtlCol="0" anchor="ctr"/>
+            <a:lstStyle/>
+            <a:p>
+              <a:pPr algn="ctr"/>
+              <a:r>
+                <a:rPr lang="en-TW" sz="800" dirty="0"/>
+                <a:t>Image - 1</a:t>
+              </a:r>
+            </a:p>
+          </p:txBody>
+        </p:sp>
+        <p:sp>
+          <p:nvSpPr>
+            <p:cNvPr id="7" name="Rounded Rectangle 6">
+              <a:extLst>
+                <a:ext uri="{FF2B5EF4-FFF2-40B4-BE49-F238E27FC236}">
+                  <a16:creationId xmlns:a16="http://schemas.microsoft.com/office/drawing/2014/main" id="{B1712C30-95F4-DA84-02B3-9CEDA2221A71}"/>
+                </a:ext>
+              </a:extLst>
+            </p:cNvPr>
+            <p:cNvSpPr/>
+            <p:nvPr/>
+          </p:nvSpPr>
+          <p:spPr>
+            <a:xfrm>
+              <a:off x="4401086" y="2385880"/>
+              <a:ext cx="820395" cy="379930"/>
+            </a:xfrm>
+            <a:prstGeom prst="roundRect">
+              <a:avLst/>
+            </a:prstGeom>
+          </p:spPr>
+          <p:style>
+            <a:lnRef idx="2">
+              <a:schemeClr val="dk1"/>
+            </a:lnRef>
+            <a:fillRef idx="1">
+              <a:schemeClr val="lt1"/>
+            </a:fillRef>
+            <a:effectRef idx="0">
+              <a:schemeClr val="dk1"/>
+            </a:effectRef>
+            <a:fontRef idx="minor">
+              <a:schemeClr val="dk1"/>
+            </a:fontRef>
+          </p:style>
+          <p:txBody>
+            <a:bodyPr rtlCol="0" anchor="ctr"/>
+            <a:lstStyle/>
+            <a:p>
+              <a:pPr algn="ctr"/>
+              <a:r>
+                <a:rPr lang="en-TW" sz="800" dirty="0"/>
+                <a:t>Image - 2</a:t>
+              </a:r>
+            </a:p>
+          </p:txBody>
+        </p:sp>
+        <p:sp>
+          <p:nvSpPr>
+            <p:cNvPr id="8" name="Rounded Rectangle 7">
+              <a:extLst>
+                <a:ext uri="{FF2B5EF4-FFF2-40B4-BE49-F238E27FC236}">
+                  <a16:creationId xmlns:a16="http://schemas.microsoft.com/office/drawing/2014/main" id="{4F08DBFB-32F2-C274-0B54-30E8D335E513}"/>
+                </a:ext>
+              </a:extLst>
+            </p:cNvPr>
+            <p:cNvSpPr/>
+            <p:nvPr/>
+          </p:nvSpPr>
+          <p:spPr>
+            <a:xfrm>
+              <a:off x="6433553" y="2385880"/>
+              <a:ext cx="820395" cy="379930"/>
+            </a:xfrm>
+            <a:prstGeom prst="roundRect">
+              <a:avLst/>
+            </a:prstGeom>
+          </p:spPr>
+          <p:style>
+            <a:lnRef idx="2">
+              <a:schemeClr val="dk1"/>
+            </a:lnRef>
+            <a:fillRef idx="1">
+              <a:schemeClr val="lt1"/>
+            </a:fillRef>
+            <a:effectRef idx="0">
+              <a:schemeClr val="dk1"/>
+            </a:effectRef>
+            <a:fontRef idx="minor">
+              <a:schemeClr val="dk1"/>
+            </a:fontRef>
+          </p:style>
+          <p:txBody>
+            <a:bodyPr rtlCol="0" anchor="ctr"/>
+            <a:lstStyle/>
+            <a:p>
+              <a:pPr algn="ctr"/>
+              <a:r>
+                <a:rPr lang="en-TW" sz="800" dirty="0"/>
+                <a:t>Images</a:t>
+              </a:r>
+            </a:p>
+          </p:txBody>
+        </p:sp>
+        <p:cxnSp>
+          <p:nvCxnSpPr>
+            <p:cNvPr id="11" name="Curved Connector 10">
+              <a:extLst>
+                <a:ext uri="{FF2B5EF4-FFF2-40B4-BE49-F238E27FC236}">
+                  <a16:creationId xmlns:a16="http://schemas.microsoft.com/office/drawing/2014/main" id="{9FD51E37-0327-B7B5-6EA1-5DBEC9162F5B}"/>
+                </a:ext>
+              </a:extLst>
+            </p:cNvPr>
+            <p:cNvCxnSpPr>
+              <a:cxnSpLocks/>
+              <a:stCxn id="8" idx="0"/>
+              <a:endCxn id="6" idx="0"/>
+            </p:cNvCxnSpPr>
+            <p:nvPr/>
+          </p:nvCxnSpPr>
+          <p:spPr>
+            <a:xfrm rot="16200000" flipV="1">
+              <a:off x="5417321" y="959449"/>
+              <a:ext cx="12700" cy="2852861"/>
+            </a:xfrm>
+            <a:prstGeom prst="curvedConnector3">
+              <a:avLst>
+                <a:gd name="adj1" fmla="val 1800000"/>
+              </a:avLst>
+            </a:prstGeom>
+            <a:ln>
+              <a:tailEnd type="triangle"/>
+            </a:ln>
+          </p:spPr>
+          <p:style>
+            <a:lnRef idx="2">
+              <a:schemeClr val="dk1"/>
+            </a:lnRef>
+            <a:fillRef idx="1">
+              <a:schemeClr val="lt1"/>
+            </a:fillRef>
+            <a:effectRef idx="0">
+              <a:schemeClr val="dk1"/>
+            </a:effectRef>
+            <a:fontRef idx="minor">
+              <a:schemeClr val="dk1"/>
+            </a:fontRef>
+          </p:style>
+        </p:cxnSp>
+        <p:cxnSp>
+          <p:nvCxnSpPr>
+            <p:cNvPr id="30" name="Curved Connector 29">
+              <a:extLst>
+                <a:ext uri="{FF2B5EF4-FFF2-40B4-BE49-F238E27FC236}">
+                  <a16:creationId xmlns:a16="http://schemas.microsoft.com/office/drawing/2014/main" id="{B7E457A6-FB60-2319-6B24-50921385011D}"/>
+                </a:ext>
+              </a:extLst>
+            </p:cNvPr>
+            <p:cNvCxnSpPr>
+              <a:cxnSpLocks/>
+              <a:stCxn id="8" idx="0"/>
+              <a:endCxn id="7" idx="0"/>
+            </p:cNvCxnSpPr>
+            <p:nvPr/>
+          </p:nvCxnSpPr>
+          <p:spPr>
+            <a:xfrm rot="16200000" flipV="1">
+              <a:off x="5827518" y="1369646"/>
+              <a:ext cx="12700" cy="2032467"/>
+            </a:xfrm>
+            <a:prstGeom prst="curvedConnector3">
+              <a:avLst>
+                <a:gd name="adj1" fmla="val 1463512"/>
+              </a:avLst>
+            </a:prstGeom>
+            <a:ln>
+              <a:tailEnd type="triangle"/>
+            </a:ln>
+          </p:spPr>
+          <p:style>
+            <a:lnRef idx="2">
+              <a:schemeClr val="dk1"/>
+            </a:lnRef>
+            <a:fillRef idx="1">
+              <a:schemeClr val="lt1"/>
+            </a:fillRef>
+            <a:effectRef idx="0">
+              <a:schemeClr val="dk1"/>
+            </a:effectRef>
+            <a:fontRef idx="minor">
+              <a:schemeClr val="dk1"/>
+            </a:fontRef>
+          </p:style>
+        </p:cxnSp>
+        <p:cxnSp>
+          <p:nvCxnSpPr>
+            <p:cNvPr id="35" name="Straight Arrow Connector 34">
+              <a:extLst>
+                <a:ext uri="{FF2B5EF4-FFF2-40B4-BE49-F238E27FC236}">
+                  <a16:creationId xmlns:a16="http://schemas.microsoft.com/office/drawing/2014/main" id="{B24028B6-13B6-E3E6-6168-AA5AF1D6EF32}"/>
+                </a:ext>
+              </a:extLst>
+            </p:cNvPr>
+            <p:cNvCxnSpPr>
+              <a:stCxn id="6" idx="2"/>
+              <a:endCxn id="2" idx="0"/>
+            </p:cNvCxnSpPr>
+            <p:nvPr/>
+          </p:nvCxnSpPr>
+          <p:spPr>
+            <a:xfrm>
+              <a:off x="3990890" y="2765810"/>
+              <a:ext cx="0" cy="189966"/>
+            </a:xfrm>
+            <a:prstGeom prst="straightConnector1">
+              <a:avLst/>
+            </a:prstGeom>
+            <a:ln>
+              <a:tailEnd type="triangle"/>
+            </a:ln>
+          </p:spPr>
+          <p:style>
+            <a:lnRef idx="2">
+              <a:schemeClr val="dk1"/>
+            </a:lnRef>
+            <a:fillRef idx="1">
+              <a:schemeClr val="lt1"/>
+            </a:fillRef>
+            <a:effectRef idx="0">
+              <a:schemeClr val="dk1"/>
+            </a:effectRef>
+            <a:fontRef idx="minor">
+              <a:schemeClr val="dk1"/>
+            </a:fontRef>
+          </p:style>
+        </p:cxnSp>
+        <p:cxnSp>
+          <p:nvCxnSpPr>
+            <p:cNvPr id="36" name="Straight Arrow Connector 35">
+              <a:extLst>
+                <a:ext uri="{FF2B5EF4-FFF2-40B4-BE49-F238E27FC236}">
+                  <a16:creationId xmlns:a16="http://schemas.microsoft.com/office/drawing/2014/main" id="{2AF22135-69F2-1C9D-D993-88F8B842FC32}"/>
+                </a:ext>
+              </a:extLst>
+            </p:cNvPr>
+            <p:cNvCxnSpPr>
+              <a:cxnSpLocks/>
+              <a:stCxn id="7" idx="2"/>
+              <a:endCxn id="3" idx="0"/>
+            </p:cNvCxnSpPr>
+            <p:nvPr/>
+          </p:nvCxnSpPr>
+          <p:spPr>
+            <a:xfrm>
+              <a:off x="4811284" y="2765810"/>
+              <a:ext cx="1" cy="189965"/>
+            </a:xfrm>
+            <a:prstGeom prst="straightConnector1">
+              <a:avLst/>
+            </a:prstGeom>
+            <a:ln>
+              <a:tailEnd type="triangle"/>
+            </a:ln>
+          </p:spPr>
+          <p:style>
+            <a:lnRef idx="2">
+              <a:schemeClr val="dk1"/>
+            </a:lnRef>
+            <a:fillRef idx="1">
+              <a:schemeClr val="lt1"/>
+            </a:fillRef>
+            <a:effectRef idx="0">
+              <a:schemeClr val="dk1"/>
+            </a:effectRef>
+            <a:fontRef idx="minor">
+              <a:schemeClr val="dk1"/>
+            </a:fontRef>
+          </p:style>
+        </p:cxnSp>
+        <p:cxnSp>
+          <p:nvCxnSpPr>
+            <p:cNvPr id="39" name="Straight Arrow Connector 38">
+              <a:extLst>
+                <a:ext uri="{FF2B5EF4-FFF2-40B4-BE49-F238E27FC236}">
+                  <a16:creationId xmlns:a16="http://schemas.microsoft.com/office/drawing/2014/main" id="{C26B7648-69A3-437C-D0F3-4C1E456B36DE}"/>
+                </a:ext>
+              </a:extLst>
+            </p:cNvPr>
+            <p:cNvCxnSpPr>
+              <a:cxnSpLocks/>
+              <a:stCxn id="5" idx="0"/>
+              <a:endCxn id="8" idx="2"/>
+            </p:cNvCxnSpPr>
+            <p:nvPr/>
+          </p:nvCxnSpPr>
+          <p:spPr>
+            <a:xfrm flipV="1">
+              <a:off x="6843751" y="2765810"/>
+              <a:ext cx="0" cy="189965"/>
+            </a:xfrm>
+            <a:prstGeom prst="straightConnector1">
+              <a:avLst/>
+            </a:prstGeom>
+            <a:ln>
+              <a:tailEnd type="triangle"/>
+            </a:ln>
+          </p:spPr>
+          <p:style>
+            <a:lnRef idx="2">
+              <a:schemeClr val="dk1"/>
+            </a:lnRef>
+            <a:fillRef idx="1">
+              <a:schemeClr val="lt1"/>
+            </a:fillRef>
+            <a:effectRef idx="0">
+              <a:schemeClr val="dk1"/>
+            </a:effectRef>
+            <a:fontRef idx="minor">
+              <a:schemeClr val="dk1"/>
+            </a:fontRef>
+          </p:style>
+        </p:cxnSp>
+        <p:sp>
+          <p:nvSpPr>
+            <p:cNvPr id="44" name="Rounded Rectangle 43">
+              <a:extLst>
+                <a:ext uri="{FF2B5EF4-FFF2-40B4-BE49-F238E27FC236}">
+                  <a16:creationId xmlns:a16="http://schemas.microsoft.com/office/drawing/2014/main" id="{987B597D-E1C3-6009-60FD-B1FE714DCF93}"/>
+                </a:ext>
+              </a:extLst>
+            </p:cNvPr>
+            <p:cNvSpPr/>
+            <p:nvPr/>
+          </p:nvSpPr>
+          <p:spPr>
+            <a:xfrm>
+              <a:off x="3606330" y="4092187"/>
+              <a:ext cx="1615151" cy="379930"/>
+            </a:xfrm>
+            <a:prstGeom prst="roundRect">
+              <a:avLst/>
+            </a:prstGeom>
+          </p:spPr>
+          <p:style>
+            <a:lnRef idx="2">
+              <a:schemeClr val="dk1"/>
+            </a:lnRef>
+            <a:fillRef idx="1">
+              <a:schemeClr val="lt1"/>
+            </a:fillRef>
+            <a:effectRef idx="0">
+              <a:schemeClr val="dk1"/>
+            </a:effectRef>
+            <a:fontRef idx="minor">
+              <a:schemeClr val="dk1"/>
+            </a:fontRef>
+          </p:style>
+          <p:txBody>
+            <a:bodyPr rtlCol="0" anchor="ctr"/>
+            <a:lstStyle/>
+            <a:p>
+              <a:pPr algn="ctr"/>
+              <a:r>
+                <a:rPr lang="en-TW" sz="800" dirty="0"/>
+                <a:t>Compose</a:t>
+              </a:r>
+            </a:p>
+          </p:txBody>
+        </p:sp>
+        <p:cxnSp>
+          <p:nvCxnSpPr>
+            <p:cNvPr id="48" name="Curved Connector 47">
+              <a:extLst>
+                <a:ext uri="{FF2B5EF4-FFF2-40B4-BE49-F238E27FC236}">
+                  <a16:creationId xmlns:a16="http://schemas.microsoft.com/office/drawing/2014/main" id="{751CA2D0-6BEA-FEB9-1CE5-E121F45A470F}"/>
+                </a:ext>
+              </a:extLst>
+            </p:cNvPr>
+            <p:cNvCxnSpPr>
+              <a:cxnSpLocks/>
+              <a:stCxn id="44" idx="1"/>
+              <a:endCxn id="6" idx="1"/>
+            </p:cNvCxnSpPr>
+            <p:nvPr/>
+          </p:nvCxnSpPr>
+          <p:spPr>
+            <a:xfrm rot="10800000">
+              <a:off x="3580692" y="2575846"/>
+              <a:ext cx="25638" cy="1706307"/>
+            </a:xfrm>
+            <a:prstGeom prst="curvedConnector3">
+              <a:avLst>
+                <a:gd name="adj1" fmla="val 991645"/>
+              </a:avLst>
+            </a:prstGeom>
+            <a:ln>
+              <a:prstDash val="dash"/>
+            </a:ln>
+          </p:spPr>
+          <p:style>
+            <a:lnRef idx="1">
+              <a:schemeClr val="dk1"/>
+            </a:lnRef>
+            <a:fillRef idx="0">
+              <a:schemeClr val="dk1"/>
+            </a:fillRef>
+            <a:effectRef idx="0">
+              <a:schemeClr val="dk1"/>
+            </a:effectRef>
+            <a:fontRef idx="minor">
+              <a:schemeClr val="tx1"/>
+            </a:fontRef>
+          </p:style>
+        </p:cxnSp>
+        <p:cxnSp>
+          <p:nvCxnSpPr>
+            <p:cNvPr id="52" name="Curved Connector 51">
+              <a:extLst>
+                <a:ext uri="{FF2B5EF4-FFF2-40B4-BE49-F238E27FC236}">
+                  <a16:creationId xmlns:a16="http://schemas.microsoft.com/office/drawing/2014/main" id="{F299692F-9736-2E46-5C9C-31331C48C250}"/>
+                </a:ext>
+              </a:extLst>
+            </p:cNvPr>
+            <p:cNvCxnSpPr>
+              <a:cxnSpLocks/>
+              <a:stCxn id="44" idx="3"/>
+              <a:endCxn id="7" idx="3"/>
+            </p:cNvCxnSpPr>
+            <p:nvPr/>
+          </p:nvCxnSpPr>
+          <p:spPr>
+            <a:xfrm flipV="1">
+              <a:off x="5221481" y="2575845"/>
+              <a:ext cx="12700" cy="1706307"/>
+            </a:xfrm>
+            <a:prstGeom prst="curvedConnector3">
+              <a:avLst>
+                <a:gd name="adj1" fmla="val 1800000"/>
+              </a:avLst>
+            </a:prstGeom>
+            <a:ln>
+              <a:prstDash val="dash"/>
+            </a:ln>
+          </p:spPr>
+          <p:style>
+            <a:lnRef idx="1">
+              <a:schemeClr val="dk1"/>
+            </a:lnRef>
+            <a:fillRef idx="0">
+              <a:schemeClr val="dk1"/>
+            </a:fillRef>
+            <a:effectRef idx="0">
+              <a:schemeClr val="dk1"/>
+            </a:effectRef>
+            <a:fontRef idx="minor">
+              <a:schemeClr val="tx1"/>
+            </a:fontRef>
+          </p:style>
+        </p:cxnSp>
+      </p:grpSp>
+    </p:spTree>
+    <p:extLst>
+      <p:ext uri="{BB962C8B-B14F-4D97-AF65-F5344CB8AC3E}">
+        <p14:creationId xmlns:p14="http://schemas.microsoft.com/office/powerpoint/2010/main" val="1572480018"/>
+      </p:ext>
+    </p:extLst>
+  </p:cSld>
+  <p:clrMapOvr>
+    <a:masterClrMapping/>
+  </p:clrMapOvr>
+</p:sld>
+</file>
+
+<file path=ppt/slides/slide2.xml><?xml version="1.0" encoding="utf-8"?>
+<p:sld xmlns:a="http://schemas.openxmlformats.org/drawingml/2006/main" xmlns:r="http://schemas.openxmlformats.org/officeDocument/2006/relationships" xmlns:p="http://schemas.openxmlformats.org/presentationml/2006/main">
+  <p:cSld>
+    <p:spTree>
+      <p:nvGrpSpPr>
+        <p:cNvPr id="1" name=""/>
+        <p:cNvGrpSpPr/>
+        <p:nvPr/>
+      </p:nvGrpSpPr>
+      <p:grpSpPr>
+        <a:xfrm>
+          <a:off x="0" y="0"/>
+          <a:ext cx="0" cy="0"/>
+          <a:chOff x="0" y="0"/>
+          <a:chExt cx="0" cy="0"/>
+        </a:xfrm>
+      </p:grpSpPr>
+      <p:grpSp>
+        <p:nvGrpSpPr>
+          <p:cNvPr id="42" name="Group 41">
+            <a:extLst>
+              <a:ext uri="{FF2B5EF4-FFF2-40B4-BE49-F238E27FC236}">
+                <a16:creationId xmlns:a16="http://schemas.microsoft.com/office/drawing/2014/main" id="{22C4C49E-7563-1258-9308-64A79A309A7E}"/>
+              </a:ext>
+            </a:extLst>
+          </p:cNvPr>
+          <p:cNvGrpSpPr/>
+          <p:nvPr/>
+        </p:nvGrpSpPr>
+        <p:grpSpPr>
+          <a:xfrm>
+            <a:off x="2802661" y="999141"/>
+            <a:ext cx="6790349" cy="3953863"/>
+            <a:chOff x="2885626" y="466449"/>
+            <a:chExt cx="6790349" cy="3953863"/>
+          </a:xfrm>
+        </p:grpSpPr>
+        <p:sp>
+          <p:nvSpPr>
+            <p:cNvPr id="4" name="Rectangle 3">
+              <a:extLst>
+                <a:ext uri="{FF2B5EF4-FFF2-40B4-BE49-F238E27FC236}">
+                  <a16:creationId xmlns:a16="http://schemas.microsoft.com/office/drawing/2014/main" id="{DE79AB0E-A3B5-0FA5-2219-A875F28C8075}"/>
+                </a:ext>
+              </a:extLst>
+            </p:cNvPr>
+            <p:cNvSpPr/>
+            <p:nvPr/>
+          </p:nvSpPr>
+          <p:spPr>
+            <a:xfrm>
+              <a:off x="4681673" y="4018660"/>
+              <a:ext cx="2828658" cy="401652"/>
+            </a:xfrm>
+            <a:prstGeom prst="rect">
+              <a:avLst/>
+            </a:prstGeom>
+          </p:spPr>
+          <p:style>
+            <a:lnRef idx="2">
+              <a:schemeClr val="dk1"/>
+            </a:lnRef>
+            <a:fillRef idx="1">
+              <a:schemeClr val="lt1"/>
+            </a:fillRef>
+            <a:effectRef idx="0">
+              <a:schemeClr val="dk1"/>
+            </a:effectRef>
+            <a:fontRef idx="minor">
+              <a:schemeClr val="dk1"/>
+            </a:fontRef>
+          </p:style>
+          <p:txBody>
+            <a:bodyPr rtlCol="0" anchor="ctr"/>
+            <a:lstStyle/>
+            <a:p>
+              <a:pPr algn="ctr"/>
+              <a:r>
+                <a:rPr lang="en-US" sz="1200" dirty="0"/>
+                <a:t>d</a:t>
+              </a:r>
+              <a:r>
+                <a:rPr lang="en-TW" sz="1200" dirty="0"/>
+                <a:t>ocs.com-express</a:t>
+              </a:r>
+            </a:p>
+          </p:txBody>
+        </p:sp>
+        <p:sp>
+          <p:nvSpPr>
+            <p:cNvPr id="6" name="Rectangle 5">
+              <a:extLst>
+                <a:ext uri="{FF2B5EF4-FFF2-40B4-BE49-F238E27FC236}">
+                  <a16:creationId xmlns:a16="http://schemas.microsoft.com/office/drawing/2014/main" id="{3B8BDFFC-EC4B-9FE7-7161-617AC690A8F5}"/>
+                </a:ext>
+              </a:extLst>
+            </p:cNvPr>
+            <p:cNvSpPr/>
+            <p:nvPr/>
+          </p:nvSpPr>
+          <p:spPr>
+            <a:xfrm>
+              <a:off x="4681674" y="3617008"/>
+              <a:ext cx="942887" cy="401652"/>
+            </a:xfrm>
+            <a:prstGeom prst="rect">
+              <a:avLst/>
+            </a:prstGeom>
+          </p:spPr>
+          <p:style>
+            <a:lnRef idx="2">
+              <a:schemeClr val="dk1"/>
+            </a:lnRef>
+            <a:fillRef idx="1">
+              <a:schemeClr val="lt1"/>
+            </a:fillRef>
+            <a:effectRef idx="0">
+              <a:schemeClr val="dk1"/>
+            </a:effectRef>
+            <a:fontRef idx="minor">
+              <a:schemeClr val="dk1"/>
+            </a:fontRef>
+          </p:style>
+          <p:txBody>
+            <a:bodyPr rtlCol="0" anchor="ctr"/>
+            <a:lstStyle/>
+            <a:p>
+              <a:pPr algn="ctr"/>
+              <a:r>
+                <a:rPr lang="en-US" sz="1200" dirty="0"/>
+                <a:t>main</a:t>
+              </a:r>
+              <a:endParaRPr lang="en-TW" sz="1200" dirty="0"/>
+            </a:p>
+          </p:txBody>
+        </p:sp>
+        <p:sp>
+          <p:nvSpPr>
+            <p:cNvPr id="7" name="Rectangle 6">
+              <a:extLst>
+                <a:ext uri="{FF2B5EF4-FFF2-40B4-BE49-F238E27FC236}">
+                  <a16:creationId xmlns:a16="http://schemas.microsoft.com/office/drawing/2014/main" id="{CD9167D5-CEBC-20CC-A247-0D93761A184A}"/>
+                </a:ext>
+              </a:extLst>
+            </p:cNvPr>
+            <p:cNvSpPr/>
+            <p:nvPr/>
+          </p:nvSpPr>
+          <p:spPr>
+            <a:xfrm>
+              <a:off x="5624557" y="3617008"/>
+              <a:ext cx="942887" cy="401652"/>
+            </a:xfrm>
+            <a:prstGeom prst="rect">
+              <a:avLst/>
+            </a:prstGeom>
+          </p:spPr>
+          <p:style>
+            <a:lnRef idx="2">
+              <a:schemeClr val="dk1"/>
+            </a:lnRef>
+            <a:fillRef idx="1">
+              <a:schemeClr val="lt1"/>
+            </a:fillRef>
+            <a:effectRef idx="0">
+              <a:schemeClr val="dk1"/>
+            </a:effectRef>
+            <a:fontRef idx="minor">
+              <a:schemeClr val="dk1"/>
+            </a:fontRef>
+          </p:style>
+          <p:txBody>
+            <a:bodyPr rtlCol="0" anchor="ctr"/>
+            <a:lstStyle/>
+            <a:p>
+              <a:pPr algn="ctr"/>
+              <a:r>
+                <a:rPr lang="en-US" sz="1200" dirty="0"/>
+                <a:t>alex-wang</a:t>
+              </a:r>
+              <a:endParaRPr lang="en-TW" sz="1200" dirty="0"/>
+            </a:p>
+          </p:txBody>
+        </p:sp>
+        <p:sp>
+          <p:nvSpPr>
+            <p:cNvPr id="9" name="Rectangle 8">
+              <a:extLst>
+                <a:ext uri="{FF2B5EF4-FFF2-40B4-BE49-F238E27FC236}">
+                  <a16:creationId xmlns:a16="http://schemas.microsoft.com/office/drawing/2014/main" id="{AA1126A8-A981-9B3D-80CD-EA9D0783AA19}"/>
+                </a:ext>
+              </a:extLst>
+            </p:cNvPr>
+            <p:cNvSpPr/>
+            <p:nvPr/>
+          </p:nvSpPr>
+          <p:spPr>
+            <a:xfrm>
+              <a:off x="8191138" y="1588802"/>
+              <a:ext cx="1115236" cy="419460"/>
+            </a:xfrm>
+            <a:prstGeom prst="rect">
+              <a:avLst/>
+            </a:prstGeom>
+          </p:spPr>
+          <p:style>
+            <a:lnRef idx="2">
+              <a:schemeClr val="dk1"/>
+            </a:lnRef>
+            <a:fillRef idx="1">
+              <a:schemeClr val="lt1"/>
+            </a:fillRef>
+            <a:effectRef idx="0">
+              <a:schemeClr val="dk1"/>
+            </a:effectRef>
+            <a:fontRef idx="minor">
+              <a:schemeClr val="dk1"/>
+            </a:fontRef>
+          </p:style>
+          <p:txBody>
+            <a:bodyPr rtlCol="0" anchor="ctr"/>
+            <a:lstStyle/>
+            <a:p>
+              <a:pPr algn="ctr"/>
+              <a:r>
+                <a:rPr lang="en-US" sz="1200" dirty="0"/>
+                <a:t>Writer</a:t>
+              </a:r>
+            </a:p>
+            <a:p>
+              <a:pPr algn="ctr"/>
+              <a:r>
+                <a:rPr lang="en-US" sz="1200" dirty="0"/>
+                <a:t>Alex</a:t>
+              </a:r>
+              <a:endParaRPr lang="en-TW" sz="1200" dirty="0"/>
+            </a:p>
+          </p:txBody>
+        </p:sp>
+        <p:sp>
+          <p:nvSpPr>
+            <p:cNvPr id="10" name="Rectangle 9">
+              <a:extLst>
+                <a:ext uri="{FF2B5EF4-FFF2-40B4-BE49-F238E27FC236}">
+                  <a16:creationId xmlns:a16="http://schemas.microsoft.com/office/drawing/2014/main" id="{B057D3B8-66D5-E031-7273-87C9DD5920B4}"/>
+                </a:ext>
+              </a:extLst>
+            </p:cNvPr>
+            <p:cNvSpPr/>
+            <p:nvPr/>
+          </p:nvSpPr>
+          <p:spPr>
+            <a:xfrm>
+              <a:off x="6567444" y="3617008"/>
+              <a:ext cx="942887" cy="401652"/>
+            </a:xfrm>
+            <a:prstGeom prst="rect">
+              <a:avLst/>
+            </a:prstGeom>
+          </p:spPr>
+          <p:style>
+            <a:lnRef idx="2">
+              <a:schemeClr val="dk1"/>
+            </a:lnRef>
+            <a:fillRef idx="1">
+              <a:schemeClr val="lt1"/>
+            </a:fillRef>
+            <a:effectRef idx="0">
+              <a:schemeClr val="dk1"/>
+            </a:effectRef>
+            <a:fontRef idx="minor">
+              <a:schemeClr val="dk1"/>
+            </a:fontRef>
+          </p:style>
+          <p:txBody>
+            <a:bodyPr rtlCol="0" anchor="ctr"/>
+            <a:lstStyle/>
+            <a:p>
+              <a:pPr algn="ctr"/>
+              <a:r>
+                <a:rPr lang="en-US" sz="1200" dirty="0"/>
+                <a:t>others…</a:t>
+              </a:r>
+              <a:endParaRPr lang="en-TW" sz="1200" dirty="0"/>
+            </a:p>
+          </p:txBody>
+        </p:sp>
+        <p:sp>
+          <p:nvSpPr>
+            <p:cNvPr id="14" name="Rectangle 13">
+              <a:extLst>
+                <a:ext uri="{FF2B5EF4-FFF2-40B4-BE49-F238E27FC236}">
+                  <a16:creationId xmlns:a16="http://schemas.microsoft.com/office/drawing/2014/main" id="{D801AE31-0A2F-AEF0-FECF-802B04FFD329}"/>
+                </a:ext>
+              </a:extLst>
+            </p:cNvPr>
+            <p:cNvSpPr/>
+            <p:nvPr/>
+          </p:nvSpPr>
+          <p:spPr>
+            <a:xfrm>
+              <a:off x="5538382" y="1588802"/>
+              <a:ext cx="1115236" cy="419460"/>
+            </a:xfrm>
+            <a:prstGeom prst="rect">
+              <a:avLst/>
+            </a:prstGeom>
+          </p:spPr>
+          <p:style>
+            <a:lnRef idx="2">
+              <a:schemeClr val="dk1"/>
+            </a:lnRef>
+            <a:fillRef idx="1">
+              <a:schemeClr val="lt1"/>
+            </a:fillRef>
+            <a:effectRef idx="0">
+              <a:schemeClr val="dk1"/>
+            </a:effectRef>
+            <a:fontRef idx="minor">
+              <a:schemeClr val="dk1"/>
+            </a:fontRef>
+          </p:style>
+          <p:txBody>
+            <a:bodyPr rtlCol="0" anchor="ctr"/>
+            <a:lstStyle/>
+            <a:p>
+              <a:pPr algn="ctr"/>
+              <a:r>
+                <a:rPr lang="en-US" sz="1200" dirty="0"/>
+                <a:t>Reviewer</a:t>
+              </a:r>
+            </a:p>
+            <a:p>
+              <a:pPr algn="ctr"/>
+              <a:r>
+                <a:rPr lang="en-US" sz="1200" dirty="0"/>
+                <a:t>Chris</a:t>
+              </a:r>
+              <a:endParaRPr lang="en-TW" sz="1200" dirty="0"/>
+            </a:p>
+          </p:txBody>
+        </p:sp>
+        <p:sp>
+          <p:nvSpPr>
+            <p:cNvPr id="15" name="Rectangle 14">
+              <a:extLst>
+                <a:ext uri="{FF2B5EF4-FFF2-40B4-BE49-F238E27FC236}">
+                  <a16:creationId xmlns:a16="http://schemas.microsoft.com/office/drawing/2014/main" id="{B60667BC-F79A-B98D-781B-47ADF850F1F8}"/>
+                </a:ext>
+              </a:extLst>
+            </p:cNvPr>
+            <p:cNvSpPr/>
+            <p:nvPr/>
+          </p:nvSpPr>
+          <p:spPr>
+            <a:xfrm>
+              <a:off x="2885626" y="1588802"/>
+              <a:ext cx="1115236" cy="419460"/>
+            </a:xfrm>
+            <a:prstGeom prst="rect">
+              <a:avLst/>
+            </a:prstGeom>
+          </p:spPr>
+          <p:style>
+            <a:lnRef idx="2">
+              <a:schemeClr val="dk1"/>
+            </a:lnRef>
+            <a:fillRef idx="1">
+              <a:schemeClr val="lt1"/>
+            </a:fillRef>
+            <a:effectRef idx="0">
+              <a:schemeClr val="dk1"/>
+            </a:effectRef>
+            <a:fontRef idx="minor">
+              <a:schemeClr val="dk1"/>
+            </a:fontRef>
+          </p:style>
+          <p:txBody>
+            <a:bodyPr rtlCol="0" anchor="ctr"/>
+            <a:lstStyle/>
+            <a:p>
+              <a:pPr algn="ctr"/>
+              <a:r>
+                <a:rPr lang="en-US" sz="1200" dirty="0"/>
+                <a:t>Webmaster</a:t>
+              </a:r>
+            </a:p>
+            <a:p>
+              <a:pPr algn="ctr"/>
+              <a:r>
+                <a:rPr lang="en-US" sz="1200" dirty="0"/>
+                <a:t>Ken</a:t>
+              </a:r>
+              <a:endParaRPr lang="en-TW" sz="1200" dirty="0"/>
+            </a:p>
+          </p:txBody>
+        </p:sp>
+        <p:cxnSp>
+          <p:nvCxnSpPr>
+            <p:cNvPr id="17" name="Elbow Connector 16">
+              <a:extLst>
+                <a:ext uri="{FF2B5EF4-FFF2-40B4-BE49-F238E27FC236}">
+                  <a16:creationId xmlns:a16="http://schemas.microsoft.com/office/drawing/2014/main" id="{FBC8D252-EE24-A81A-726D-A33229086452}"/>
+                </a:ext>
+              </a:extLst>
+            </p:cNvPr>
+            <p:cNvCxnSpPr>
+              <a:cxnSpLocks/>
+              <a:stCxn id="7" idx="0"/>
+              <a:endCxn id="9" idx="2"/>
+            </p:cNvCxnSpPr>
+            <p:nvPr/>
+          </p:nvCxnSpPr>
+          <p:spPr>
+            <a:xfrm rot="5400000" flipH="1" flipV="1">
+              <a:off x="6618005" y="1486258"/>
+              <a:ext cx="1608746" cy="2652755"/>
+            </a:xfrm>
+            <a:prstGeom prst="bentConnector3">
+              <a:avLst/>
+            </a:prstGeom>
+            <a:ln>
+              <a:headEnd type="triangle"/>
+              <a:tailEnd type="triangle"/>
+            </a:ln>
+          </p:spPr>
+          <p:style>
+            <a:lnRef idx="2">
+              <a:schemeClr val="dk1"/>
+            </a:lnRef>
+            <a:fillRef idx="0">
+              <a:schemeClr val="dk1"/>
+            </a:fillRef>
+            <a:effectRef idx="1">
+              <a:schemeClr val="dk1"/>
+            </a:effectRef>
+            <a:fontRef idx="minor">
+              <a:schemeClr val="tx1"/>
+            </a:fontRef>
+          </p:style>
+        </p:cxnSp>
+        <p:cxnSp>
+          <p:nvCxnSpPr>
+            <p:cNvPr id="22" name="Elbow Connector 21">
+              <a:extLst>
+                <a:ext uri="{FF2B5EF4-FFF2-40B4-BE49-F238E27FC236}">
+                  <a16:creationId xmlns:a16="http://schemas.microsoft.com/office/drawing/2014/main" id="{C9BE436E-0759-8629-C83A-13DF3436A48F}"/>
+                </a:ext>
+              </a:extLst>
+            </p:cNvPr>
+            <p:cNvCxnSpPr>
+              <a:cxnSpLocks/>
+              <a:stCxn id="7" idx="0"/>
+              <a:endCxn id="6" idx="0"/>
+            </p:cNvCxnSpPr>
+            <p:nvPr/>
+          </p:nvCxnSpPr>
+          <p:spPr>
+            <a:xfrm rot="16200000" flipV="1">
+              <a:off x="5624560" y="3145566"/>
+              <a:ext cx="12700" cy="942883"/>
+            </a:xfrm>
+            <a:prstGeom prst="bentConnector3">
+              <a:avLst>
+                <a:gd name="adj1" fmla="val 6375685"/>
+              </a:avLst>
+            </a:prstGeom>
+            <a:ln>
+              <a:tailEnd type="triangle"/>
+            </a:ln>
+          </p:spPr>
+          <p:style>
+            <a:lnRef idx="2">
+              <a:schemeClr val="accent2"/>
+            </a:lnRef>
+            <a:fillRef idx="0">
+              <a:schemeClr val="accent2"/>
+            </a:fillRef>
+            <a:effectRef idx="1">
+              <a:schemeClr val="accent2"/>
+            </a:effectRef>
+            <a:fontRef idx="minor">
+              <a:schemeClr val="tx1"/>
+            </a:fontRef>
+          </p:style>
+        </p:cxnSp>
+        <p:cxnSp>
+          <p:nvCxnSpPr>
+            <p:cNvPr id="26" name="Straight Arrow Connector 25">
+              <a:extLst>
+                <a:ext uri="{FF2B5EF4-FFF2-40B4-BE49-F238E27FC236}">
+                  <a16:creationId xmlns:a16="http://schemas.microsoft.com/office/drawing/2014/main" id="{65DC6E25-4363-601C-BBE4-806197FEE2C8}"/>
+                </a:ext>
+              </a:extLst>
+            </p:cNvPr>
+            <p:cNvCxnSpPr>
+              <a:cxnSpLocks/>
+              <a:stCxn id="14" idx="2"/>
+            </p:cNvCxnSpPr>
+            <p:nvPr/>
+          </p:nvCxnSpPr>
+          <p:spPr>
+            <a:xfrm>
+              <a:off x="6096000" y="2008262"/>
+              <a:ext cx="6352" cy="804373"/>
+            </a:xfrm>
+            <a:prstGeom prst="straightConnector1">
+              <a:avLst/>
+            </a:prstGeom>
+            <a:ln>
+              <a:headEnd type="triangle"/>
+              <a:tailEnd type="triangle"/>
+            </a:ln>
+          </p:spPr>
+          <p:style>
+            <a:lnRef idx="2">
+              <a:schemeClr val="accent1"/>
+            </a:lnRef>
+            <a:fillRef idx="0">
+              <a:schemeClr val="accent1"/>
+            </a:fillRef>
+            <a:effectRef idx="1">
+              <a:schemeClr val="accent1"/>
+            </a:effectRef>
+            <a:fontRef idx="minor">
+              <a:schemeClr val="tx1"/>
+            </a:fontRef>
+          </p:style>
+        </p:cxnSp>
+        <p:cxnSp>
+          <p:nvCxnSpPr>
+            <p:cNvPr id="29" name="Elbow Connector 28">
+              <a:extLst>
+                <a:ext uri="{FF2B5EF4-FFF2-40B4-BE49-F238E27FC236}">
+                  <a16:creationId xmlns:a16="http://schemas.microsoft.com/office/drawing/2014/main" id="{8584AD8E-98CE-1F56-43FB-8F3670130C6B}"/>
+                </a:ext>
+              </a:extLst>
+            </p:cNvPr>
+            <p:cNvCxnSpPr>
+              <a:cxnSpLocks/>
+              <a:stCxn id="15" idx="2"/>
+            </p:cNvCxnSpPr>
+            <p:nvPr/>
+          </p:nvCxnSpPr>
+          <p:spPr>
+            <a:xfrm rot="16200000" flipH="1">
+              <a:off x="3895994" y="1555511"/>
+              <a:ext cx="804373" cy="1709873"/>
+            </a:xfrm>
+            <a:prstGeom prst="bentConnector2">
+              <a:avLst/>
+            </a:prstGeom>
+          </p:spPr>
+          <p:style>
+            <a:lnRef idx="2">
+              <a:schemeClr val="accent3"/>
+            </a:lnRef>
+            <a:fillRef idx="0">
+              <a:schemeClr val="accent3"/>
+            </a:fillRef>
+            <a:effectRef idx="1">
+              <a:schemeClr val="accent3"/>
+            </a:effectRef>
+            <a:fontRef idx="minor">
+              <a:schemeClr val="tx1"/>
+            </a:fontRef>
+          </p:style>
+        </p:cxnSp>
+        <p:sp>
+          <p:nvSpPr>
+            <p:cNvPr id="33" name="Folded Corner 32">
+              <a:extLst>
+                <a:ext uri="{FF2B5EF4-FFF2-40B4-BE49-F238E27FC236}">
+                  <a16:creationId xmlns:a16="http://schemas.microsoft.com/office/drawing/2014/main" id="{D1EB5C0A-8976-705B-5AC1-4D1CBBF469E8}"/>
+                </a:ext>
+              </a:extLst>
+            </p:cNvPr>
+            <p:cNvSpPr/>
+            <p:nvPr/>
+          </p:nvSpPr>
+          <p:spPr>
+            <a:xfrm>
+              <a:off x="7821537" y="868636"/>
+              <a:ext cx="1854438" cy="586279"/>
+            </a:xfrm>
+            <a:prstGeom prst="foldedCorner">
+              <a:avLst/>
+            </a:prstGeom>
+            <a:solidFill>
+              <a:schemeClr val="bg2"/>
+            </a:solidFill>
+            <a:ln>
+              <a:noFill/>
+            </a:ln>
+          </p:spPr>
+          <p:style>
+            <a:lnRef idx="2">
+              <a:schemeClr val="dk1"/>
+            </a:lnRef>
+            <a:fillRef idx="1">
+              <a:schemeClr val="lt1"/>
+            </a:fillRef>
+            <a:effectRef idx="0">
+              <a:schemeClr val="dk1"/>
+            </a:effectRef>
+            <a:fontRef idx="minor">
+              <a:schemeClr val="dk1"/>
+            </a:fontRef>
+          </p:style>
+          <p:txBody>
+            <a:bodyPr rtlCol="0" anchor="t"/>
+            <a:lstStyle/>
+            <a:p>
+              <a:r>
+                <a:rPr lang="en-US" sz="800" dirty="0"/>
+                <a:t>g</a:t>
+              </a:r>
+              <a:r>
+                <a:rPr lang="en-TW" sz="800" dirty="0"/>
+                <a:t>it pull</a:t>
+              </a:r>
+            </a:p>
+            <a:p>
+              <a:r>
+                <a:rPr lang="en-US" sz="800" dirty="0"/>
+                <a:t>g</a:t>
+              </a:r>
+              <a:r>
+                <a:rPr lang="en-TW" sz="800" dirty="0"/>
+                <a:t>it add .</a:t>
+              </a:r>
+            </a:p>
+            <a:p>
+              <a:r>
+                <a:rPr lang="en-US" sz="800" dirty="0"/>
+                <a:t>g</a:t>
+              </a:r>
+              <a:r>
+                <a:rPr lang="en-TW" sz="800" dirty="0"/>
+                <a:t>it commit –m “message”</a:t>
+              </a:r>
+            </a:p>
+            <a:p>
+              <a:r>
+                <a:rPr lang="en-US" sz="800" dirty="0"/>
+                <a:t>g</a:t>
+              </a:r>
+              <a:r>
+                <a:rPr lang="en-TW" sz="800" dirty="0"/>
+                <a:t>it push –u origin alex-wang</a:t>
+              </a:r>
+            </a:p>
+          </p:txBody>
+        </p:sp>
+        <p:sp>
+          <p:nvSpPr>
+            <p:cNvPr id="34" name="Folded Corner 33">
+              <a:extLst>
+                <a:ext uri="{FF2B5EF4-FFF2-40B4-BE49-F238E27FC236}">
+                  <a16:creationId xmlns:a16="http://schemas.microsoft.com/office/drawing/2014/main" id="{ABE6A0ED-1BA8-B87D-F734-71D786AAA6A1}"/>
+                </a:ext>
+              </a:extLst>
+            </p:cNvPr>
+            <p:cNvSpPr/>
+            <p:nvPr/>
+          </p:nvSpPr>
+          <p:spPr>
+            <a:xfrm>
+              <a:off x="5184449" y="466449"/>
+              <a:ext cx="1854438" cy="988466"/>
+            </a:xfrm>
+            <a:prstGeom prst="foldedCorner">
+              <a:avLst/>
+            </a:prstGeom>
+            <a:solidFill>
+              <a:schemeClr val="bg2"/>
+            </a:solidFill>
+            <a:ln>
+              <a:noFill/>
+            </a:ln>
+          </p:spPr>
+          <p:style>
+            <a:lnRef idx="2">
+              <a:schemeClr val="dk1"/>
+            </a:lnRef>
+            <a:fillRef idx="1">
+              <a:schemeClr val="lt1"/>
+            </a:fillRef>
+            <a:effectRef idx="0">
+              <a:schemeClr val="dk1"/>
+            </a:effectRef>
+            <a:fontRef idx="minor">
+              <a:schemeClr val="dk1"/>
+            </a:fontRef>
+          </p:style>
+          <p:txBody>
+            <a:bodyPr rtlCol="0" anchor="t"/>
+            <a:lstStyle/>
+            <a:p>
+              <a:r>
+                <a:rPr lang="en-US" sz="800" dirty="0"/>
+                <a:t>git pull</a:t>
+              </a:r>
+            </a:p>
+            <a:p>
+              <a:r>
+                <a:rPr lang="en-US" sz="800" dirty="0"/>
+                <a:t>git checkout alex-wang</a:t>
+              </a:r>
+            </a:p>
+            <a:p>
+              <a:r>
+                <a:rPr lang="en-US" sz="800" dirty="0"/>
+                <a:t>gh pr checkout 8</a:t>
+              </a:r>
+            </a:p>
+            <a:p>
+              <a:r>
+                <a:rPr lang="en-US" sz="800" dirty="0"/>
+                <a:t>git add .</a:t>
+              </a:r>
+            </a:p>
+            <a:p>
+              <a:r>
+                <a:rPr lang="en-US" sz="800" dirty="0"/>
+                <a:t>git commit –m “message”</a:t>
+              </a:r>
+            </a:p>
+            <a:p>
+              <a:r>
+                <a:rPr lang="en-US" sz="800" dirty="0"/>
+                <a:t>git push –u origin alex-wang</a:t>
+              </a:r>
+            </a:p>
+            <a:p>
+              <a:r>
+                <a:rPr lang="en-US" sz="800" dirty="0"/>
+                <a:t>gh pr merge 8</a:t>
+              </a:r>
+              <a:endParaRPr lang="en-TW" sz="800" dirty="0"/>
+            </a:p>
+          </p:txBody>
+        </p:sp>
+      </p:grpSp>
+      <p:sp>
+        <p:nvSpPr>
+          <p:cNvPr id="39" name="TextBox 38">
+            <a:extLst>
+              <a:ext uri="{FF2B5EF4-FFF2-40B4-BE49-F238E27FC236}">
+                <a16:creationId xmlns:a16="http://schemas.microsoft.com/office/drawing/2014/main" id="{B6FD2FC2-2848-76FD-54EC-7F71DA77276D}"/>
+              </a:ext>
+            </a:extLst>
+          </p:cNvPr>
+          <p:cNvSpPr txBox="1"/>
+          <p:nvPr/>
+        </p:nvSpPr>
+        <p:spPr>
+          <a:xfrm>
+            <a:off x="100412" y="6268440"/>
+            <a:ext cx="6097424" cy="461665"/>
+          </a:xfrm>
+          <a:prstGeom prst="rect">
+            <a:avLst/>
+          </a:prstGeom>
+          <a:noFill/>
+        </p:spPr>
+        <p:txBody>
+          <a:bodyPr wrap="square">
+            <a:spAutoFit/>
+          </a:bodyPr>
+          <a:lstStyle/>
+          <a:p>
+            <a:r>
+              <a:rPr lang="en-TW" sz="800" dirty="0">
+                <a:latin typeface="Calibri" panose="020F0502020204030204" pitchFamily="34" charset="0"/>
+                <a:cs typeface="Calibri" panose="020F0502020204030204" pitchFamily="34" charset="0"/>
+                <a:hlinkClick r:id="rId2"/>
+              </a:rPr>
+              <a:t>https://gitforwindows.org/</a:t>
+            </a:r>
+            <a:r>
+              <a:rPr lang="en-TW" sz="800" dirty="0">
+                <a:latin typeface="Calibri" panose="020F0502020204030204" pitchFamily="34" charset="0"/>
+                <a:cs typeface="Calibri" panose="020F0502020204030204" pitchFamily="34" charset="0"/>
+              </a:rPr>
+              <a:t> 			- Install git</a:t>
+            </a:r>
+          </a:p>
+          <a:p>
+            <a:r>
+              <a:rPr lang="en-US" sz="800" dirty="0">
+                <a:latin typeface="Calibri" panose="020F0502020204030204" pitchFamily="34" charset="0"/>
+                <a:cs typeface="Calibri" panose="020F0502020204030204" pitchFamily="34" charset="0"/>
+                <a:hlinkClick r:id="rId3"/>
+              </a:rPr>
+              <a:t>https://chatgpt.com/share/67a9bd30-a184-8006-866c-d66f827327e1</a:t>
+            </a:r>
+            <a:r>
+              <a:rPr lang="en-TW" sz="800" dirty="0">
+                <a:latin typeface="Calibri" panose="020F0502020204030204" pitchFamily="34" charset="0"/>
+                <a:cs typeface="Calibri" panose="020F0502020204030204" pitchFamily="34" charset="0"/>
+              </a:rPr>
+              <a:t> 	- Generate &amp; register SSH key</a:t>
+            </a:r>
+          </a:p>
+          <a:p>
+            <a:r>
+              <a:rPr lang="en-US" sz="800" dirty="0">
+                <a:latin typeface="Calibri" panose="020F0502020204030204" pitchFamily="34" charset="0"/>
+                <a:cs typeface="Calibri" panose="020F0502020204030204" pitchFamily="34" charset="0"/>
+                <a:hlinkClick r:id="rId4"/>
+              </a:rPr>
+              <a:t>https://github.com/cli/cli/releases/tag/v2.66.1</a:t>
+            </a:r>
+            <a:r>
+              <a:rPr lang="en-TW" sz="800" dirty="0">
+                <a:latin typeface="Calibri" panose="020F0502020204030204" pitchFamily="34" charset="0"/>
+                <a:cs typeface="Calibri" panose="020F0502020204030204" pitchFamily="34" charset="0"/>
+              </a:rPr>
+              <a:t> 		- Install gh</a:t>
+            </a:r>
+          </a:p>
+        </p:txBody>
+      </p:sp>
+      <p:sp>
+        <p:nvSpPr>
+          <p:cNvPr id="40" name="Folded Corner 39">
+            <a:extLst>
+              <a:ext uri="{FF2B5EF4-FFF2-40B4-BE49-F238E27FC236}">
+                <a16:creationId xmlns:a16="http://schemas.microsoft.com/office/drawing/2014/main" id="{4E54B5EC-B78A-E11F-D22F-C9E583415EDB}"/>
               </a:ext>
             </a:extLst>
           </p:cNvPr>
@@ -3361,309 +4864,17 @@
         </p:nvSpPr>
         <p:spPr>
           <a:xfrm>
-            <a:off x="3580692" y="2955776"/>
-            <a:ext cx="820395" cy="946447"/>
+            <a:off x="9511469" y="5910747"/>
+            <a:ext cx="2580119" cy="819358"/>
           </a:xfrm>
-          <a:prstGeom prst="roundRect">
+          <a:prstGeom prst="foldedCorner">
             <a:avLst/>
           </a:prstGeom>
-        </p:spPr>
-        <p:style>
-          <a:lnRef idx="2">
-            <a:schemeClr val="dk1"/>
-          </a:lnRef>
-          <a:fillRef idx="1">
-            <a:schemeClr val="lt1"/>
-          </a:fillRef>
-          <a:effectRef idx="0">
-            <a:schemeClr val="dk1"/>
-          </a:effectRef>
-          <a:fontRef idx="minor">
-            <a:schemeClr val="dk1"/>
-          </a:fontRef>
-        </p:style>
-        <p:txBody>
-          <a:bodyPr rtlCol="0" anchor="ctr"/>
-          <a:lstStyle/>
-          <a:p>
-            <a:pPr algn="ctr"/>
-            <a:r>
-              <a:rPr lang="en-TW" sz="800" dirty="0"/>
-              <a:t>Container- 1</a:t>
-            </a:r>
-          </a:p>
-        </p:txBody>
-      </p:sp>
-      <p:sp>
-        <p:nvSpPr>
-          <p:cNvPr id="3" name="Rounded Rectangle 2">
-            <a:extLst>
-              <a:ext uri="{FF2B5EF4-FFF2-40B4-BE49-F238E27FC236}">
-                <a16:creationId xmlns:a16="http://schemas.microsoft.com/office/drawing/2014/main" id="{95348C8E-FFEC-51FF-6E0F-9E0767ECF04A}"/>
-              </a:ext>
-            </a:extLst>
-          </p:cNvPr>
-          <p:cNvSpPr/>
-          <p:nvPr/>
-        </p:nvSpPr>
-        <p:spPr>
-          <a:xfrm>
-            <a:off x="4401087" y="2955775"/>
-            <a:ext cx="820395" cy="946447"/>
-          </a:xfrm>
-          <a:prstGeom prst="roundRect">
-            <a:avLst/>
-          </a:prstGeom>
-        </p:spPr>
-        <p:style>
-          <a:lnRef idx="2">
-            <a:schemeClr val="dk1"/>
-          </a:lnRef>
-          <a:fillRef idx="1">
-            <a:schemeClr val="lt1"/>
-          </a:fillRef>
-          <a:effectRef idx="0">
-            <a:schemeClr val="dk1"/>
-          </a:effectRef>
-          <a:fontRef idx="minor">
-            <a:schemeClr val="dk1"/>
-          </a:fontRef>
-        </p:style>
-        <p:txBody>
-          <a:bodyPr rtlCol="0" anchor="ctr"/>
-          <a:lstStyle/>
-          <a:p>
-            <a:pPr algn="ctr"/>
-            <a:r>
-              <a:rPr lang="en-TW" sz="800" dirty="0"/>
-              <a:t>Container- 1</a:t>
-            </a:r>
-          </a:p>
-        </p:txBody>
-      </p:sp>
-      <p:sp>
-        <p:nvSpPr>
-          <p:cNvPr id="5" name="Rounded Rectangle 4">
-            <a:extLst>
-              <a:ext uri="{FF2B5EF4-FFF2-40B4-BE49-F238E27FC236}">
-                <a16:creationId xmlns:a16="http://schemas.microsoft.com/office/drawing/2014/main" id="{1F3E658C-B163-11F4-E6A7-1B87A947E791}"/>
-              </a:ext>
-            </a:extLst>
-          </p:cNvPr>
-          <p:cNvSpPr/>
-          <p:nvPr/>
-        </p:nvSpPr>
-        <p:spPr>
-          <a:xfrm>
-            <a:off x="6433553" y="2955775"/>
-            <a:ext cx="820395" cy="946447"/>
-          </a:xfrm>
-          <a:prstGeom prst="roundRect">
-            <a:avLst/>
-          </a:prstGeom>
-        </p:spPr>
-        <p:style>
-          <a:lnRef idx="2">
-            <a:schemeClr val="dk1"/>
-          </a:lnRef>
-          <a:fillRef idx="1">
-            <a:schemeClr val="lt1"/>
-          </a:fillRef>
-          <a:effectRef idx="0">
-            <a:schemeClr val="dk1"/>
-          </a:effectRef>
-          <a:fontRef idx="minor">
-            <a:schemeClr val="dk1"/>
-          </a:fontRef>
-        </p:style>
-        <p:txBody>
-          <a:bodyPr rtlCol="0" anchor="ctr"/>
-          <a:lstStyle/>
-          <a:p>
-            <a:pPr algn="ctr"/>
-            <a:r>
-              <a:rPr lang="en-TW" sz="800" dirty="0"/>
-              <a:t>Hub</a:t>
-            </a:r>
-          </a:p>
-          <a:p>
-            <a:pPr algn="ctr"/>
-            <a:r>
-              <a:rPr lang="en-TW" sz="800" dirty="0"/>
-              <a:t>(Registry)</a:t>
-            </a:r>
-          </a:p>
-        </p:txBody>
-      </p:sp>
-      <p:sp>
-        <p:nvSpPr>
-          <p:cNvPr id="6" name="Rounded Rectangle 5">
-            <a:extLst>
-              <a:ext uri="{FF2B5EF4-FFF2-40B4-BE49-F238E27FC236}">
-                <a16:creationId xmlns:a16="http://schemas.microsoft.com/office/drawing/2014/main" id="{AE8CD56F-2F21-CE30-17F4-98D4A4D838DD}"/>
-              </a:ext>
-            </a:extLst>
-          </p:cNvPr>
-          <p:cNvSpPr/>
-          <p:nvPr/>
-        </p:nvSpPr>
-        <p:spPr>
-          <a:xfrm>
-            <a:off x="3580692" y="2385880"/>
-            <a:ext cx="820395" cy="379930"/>
-          </a:xfrm>
-          <a:prstGeom prst="roundRect">
-            <a:avLst/>
-          </a:prstGeom>
-        </p:spPr>
-        <p:style>
-          <a:lnRef idx="2">
-            <a:schemeClr val="dk1"/>
-          </a:lnRef>
-          <a:fillRef idx="1">
-            <a:schemeClr val="lt1"/>
-          </a:fillRef>
-          <a:effectRef idx="0">
-            <a:schemeClr val="dk1"/>
-          </a:effectRef>
-          <a:fontRef idx="minor">
-            <a:schemeClr val="dk1"/>
-          </a:fontRef>
-        </p:style>
-        <p:txBody>
-          <a:bodyPr rtlCol="0" anchor="ctr"/>
-          <a:lstStyle/>
-          <a:p>
-            <a:pPr algn="ctr"/>
-            <a:r>
-              <a:rPr lang="en-TW" sz="800" dirty="0"/>
-              <a:t>Image - 1</a:t>
-            </a:r>
-          </a:p>
-        </p:txBody>
-      </p:sp>
-      <p:sp>
-        <p:nvSpPr>
-          <p:cNvPr id="7" name="Rounded Rectangle 6">
-            <a:extLst>
-              <a:ext uri="{FF2B5EF4-FFF2-40B4-BE49-F238E27FC236}">
-                <a16:creationId xmlns:a16="http://schemas.microsoft.com/office/drawing/2014/main" id="{B1712C30-95F4-DA84-02B3-9CEDA2221A71}"/>
-              </a:ext>
-            </a:extLst>
-          </p:cNvPr>
-          <p:cNvSpPr/>
-          <p:nvPr/>
-        </p:nvSpPr>
-        <p:spPr>
-          <a:xfrm>
-            <a:off x="4401086" y="2385880"/>
-            <a:ext cx="820395" cy="379930"/>
-          </a:xfrm>
-          <a:prstGeom prst="roundRect">
-            <a:avLst/>
-          </a:prstGeom>
-        </p:spPr>
-        <p:style>
-          <a:lnRef idx="2">
-            <a:schemeClr val="dk1"/>
-          </a:lnRef>
-          <a:fillRef idx="1">
-            <a:schemeClr val="lt1"/>
-          </a:fillRef>
-          <a:effectRef idx="0">
-            <a:schemeClr val="dk1"/>
-          </a:effectRef>
-          <a:fontRef idx="minor">
-            <a:schemeClr val="dk1"/>
-          </a:fontRef>
-        </p:style>
-        <p:txBody>
-          <a:bodyPr rtlCol="0" anchor="ctr"/>
-          <a:lstStyle/>
-          <a:p>
-            <a:pPr algn="ctr"/>
-            <a:r>
-              <a:rPr lang="en-TW" sz="800" dirty="0"/>
-              <a:t>Image - 2</a:t>
-            </a:r>
-          </a:p>
-        </p:txBody>
-      </p:sp>
-      <p:sp>
-        <p:nvSpPr>
-          <p:cNvPr id="8" name="Rounded Rectangle 7">
-            <a:extLst>
-              <a:ext uri="{FF2B5EF4-FFF2-40B4-BE49-F238E27FC236}">
-                <a16:creationId xmlns:a16="http://schemas.microsoft.com/office/drawing/2014/main" id="{4F08DBFB-32F2-C274-0B54-30E8D335E513}"/>
-              </a:ext>
-            </a:extLst>
-          </p:cNvPr>
-          <p:cNvSpPr/>
-          <p:nvPr/>
-        </p:nvSpPr>
-        <p:spPr>
-          <a:xfrm>
-            <a:off x="6433553" y="2385880"/>
-            <a:ext cx="820395" cy="379930"/>
-          </a:xfrm>
-          <a:prstGeom prst="roundRect">
-            <a:avLst/>
-          </a:prstGeom>
-        </p:spPr>
-        <p:style>
-          <a:lnRef idx="2">
-            <a:schemeClr val="dk1"/>
-          </a:lnRef>
-          <a:fillRef idx="1">
-            <a:schemeClr val="lt1"/>
-          </a:fillRef>
-          <a:effectRef idx="0">
-            <a:schemeClr val="dk1"/>
-          </a:effectRef>
-          <a:fontRef idx="minor">
-            <a:schemeClr val="dk1"/>
-          </a:fontRef>
-        </p:style>
-        <p:txBody>
-          <a:bodyPr rtlCol="0" anchor="ctr"/>
-          <a:lstStyle/>
-          <a:p>
-            <a:pPr algn="ctr"/>
-            <a:r>
-              <a:rPr lang="en-TW" sz="800" dirty="0"/>
-              <a:t>Images</a:t>
-            </a:r>
-          </a:p>
-        </p:txBody>
-      </p:sp>
-      <p:cxnSp>
-        <p:nvCxnSpPr>
-          <p:cNvPr id="11" name="Curved Connector 10">
-            <a:extLst>
-              <a:ext uri="{FF2B5EF4-FFF2-40B4-BE49-F238E27FC236}">
-                <a16:creationId xmlns:a16="http://schemas.microsoft.com/office/drawing/2014/main" id="{9FD51E37-0327-B7B5-6EA1-5DBEC9162F5B}"/>
-              </a:ext>
-            </a:extLst>
-          </p:cNvPr>
-          <p:cNvCxnSpPr>
-            <a:cxnSpLocks/>
-            <a:stCxn id="8" idx="0"/>
-            <a:endCxn id="6" idx="0"/>
-          </p:cNvCxnSpPr>
-          <p:nvPr/>
-        </p:nvCxnSpPr>
-        <p:spPr>
-          <a:xfrm rot="16200000" flipV="1">
-            <a:off x="5417321" y="959449"/>
-            <a:ext cx="12700" cy="2852861"/>
-          </a:xfrm>
-          <a:prstGeom prst="curvedConnector3">
-            <a:avLst>
-              <a:gd name="adj1" fmla="val 1800000"/>
-            </a:avLst>
-          </a:prstGeom>
+          <a:solidFill>
+            <a:schemeClr val="bg2"/>
+          </a:solidFill>
           <a:ln>
-            <a:tailEnd type="triangle"/>
+            <a:noFill/>
           </a:ln>
         </p:spPr>
         <p:style>
@@ -3680,321 +4891,59 @@
             <a:schemeClr val="dk1"/>
           </a:fontRef>
         </p:style>
-      </p:cxnSp>
-      <p:cxnSp>
-        <p:nvCxnSpPr>
-          <p:cNvPr id="30" name="Curved Connector 29">
-            <a:extLst>
-              <a:ext uri="{FF2B5EF4-FFF2-40B4-BE49-F238E27FC236}">
-                <a16:creationId xmlns:a16="http://schemas.microsoft.com/office/drawing/2014/main" id="{B7E457A6-FB60-2319-6B24-50921385011D}"/>
-              </a:ext>
-            </a:extLst>
-          </p:cNvPr>
-          <p:cNvCxnSpPr>
-            <a:cxnSpLocks/>
-            <a:stCxn id="8" idx="0"/>
-            <a:endCxn id="7" idx="0"/>
-          </p:cNvCxnSpPr>
-          <p:nvPr/>
-        </p:nvCxnSpPr>
-        <p:spPr>
-          <a:xfrm rot="16200000" flipV="1">
-            <a:off x="5827518" y="1369646"/>
-            <a:ext cx="12700" cy="2032467"/>
-          </a:xfrm>
-          <a:prstGeom prst="curvedConnector3">
-            <a:avLst>
-              <a:gd name="adj1" fmla="val 1463512"/>
-            </a:avLst>
-          </a:prstGeom>
-          <a:ln>
-            <a:tailEnd type="triangle"/>
-          </a:ln>
-        </p:spPr>
-        <p:style>
-          <a:lnRef idx="2">
-            <a:schemeClr val="dk1"/>
-          </a:lnRef>
-          <a:fillRef idx="1">
-            <a:schemeClr val="lt1"/>
-          </a:fillRef>
-          <a:effectRef idx="0">
-            <a:schemeClr val="dk1"/>
-          </a:effectRef>
-          <a:fontRef idx="minor">
-            <a:schemeClr val="dk1"/>
-          </a:fontRef>
-        </p:style>
-      </p:cxnSp>
-      <p:cxnSp>
-        <p:nvCxnSpPr>
-          <p:cNvPr id="35" name="Straight Arrow Connector 34">
-            <a:extLst>
-              <a:ext uri="{FF2B5EF4-FFF2-40B4-BE49-F238E27FC236}">
-                <a16:creationId xmlns:a16="http://schemas.microsoft.com/office/drawing/2014/main" id="{B24028B6-13B6-E3E6-6168-AA5AF1D6EF32}"/>
-              </a:ext>
-            </a:extLst>
-          </p:cNvPr>
-          <p:cNvCxnSpPr>
-            <a:stCxn id="6" idx="2"/>
-            <a:endCxn id="2" idx="0"/>
-          </p:cNvCxnSpPr>
-          <p:nvPr/>
-        </p:nvCxnSpPr>
-        <p:spPr>
-          <a:xfrm>
-            <a:off x="3990890" y="2765810"/>
-            <a:ext cx="0" cy="189966"/>
-          </a:xfrm>
-          <a:prstGeom prst="straightConnector1">
-            <a:avLst/>
-          </a:prstGeom>
-          <a:ln>
-            <a:tailEnd type="triangle"/>
-          </a:ln>
-        </p:spPr>
-        <p:style>
-          <a:lnRef idx="2">
-            <a:schemeClr val="dk1"/>
-          </a:lnRef>
-          <a:fillRef idx="1">
-            <a:schemeClr val="lt1"/>
-          </a:fillRef>
-          <a:effectRef idx="0">
-            <a:schemeClr val="dk1"/>
-          </a:effectRef>
-          <a:fontRef idx="minor">
-            <a:schemeClr val="dk1"/>
-          </a:fontRef>
-        </p:style>
-      </p:cxnSp>
-      <p:cxnSp>
-        <p:nvCxnSpPr>
-          <p:cNvPr id="36" name="Straight Arrow Connector 35">
-            <a:extLst>
-              <a:ext uri="{FF2B5EF4-FFF2-40B4-BE49-F238E27FC236}">
-                <a16:creationId xmlns:a16="http://schemas.microsoft.com/office/drawing/2014/main" id="{2AF22135-69F2-1C9D-D993-88F8B842FC32}"/>
-              </a:ext>
-            </a:extLst>
-          </p:cNvPr>
-          <p:cNvCxnSpPr>
-            <a:cxnSpLocks/>
-            <a:stCxn id="7" idx="2"/>
-            <a:endCxn id="3" idx="0"/>
-          </p:cNvCxnSpPr>
-          <p:nvPr/>
-        </p:nvCxnSpPr>
-        <p:spPr>
-          <a:xfrm>
-            <a:off x="4811284" y="2765810"/>
-            <a:ext cx="1" cy="189965"/>
-          </a:xfrm>
-          <a:prstGeom prst="straightConnector1">
-            <a:avLst/>
-          </a:prstGeom>
-          <a:ln>
-            <a:tailEnd type="triangle"/>
-          </a:ln>
-        </p:spPr>
-        <p:style>
-          <a:lnRef idx="2">
-            <a:schemeClr val="dk1"/>
-          </a:lnRef>
-          <a:fillRef idx="1">
-            <a:schemeClr val="lt1"/>
-          </a:fillRef>
-          <a:effectRef idx="0">
-            <a:schemeClr val="dk1"/>
-          </a:effectRef>
-          <a:fontRef idx="minor">
-            <a:schemeClr val="dk1"/>
-          </a:fontRef>
-        </p:style>
-      </p:cxnSp>
-      <p:cxnSp>
-        <p:nvCxnSpPr>
-          <p:cNvPr id="39" name="Straight Arrow Connector 38">
-            <a:extLst>
-              <a:ext uri="{FF2B5EF4-FFF2-40B4-BE49-F238E27FC236}">
-                <a16:creationId xmlns:a16="http://schemas.microsoft.com/office/drawing/2014/main" id="{C26B7648-69A3-437C-D0F3-4C1E456B36DE}"/>
-              </a:ext>
-            </a:extLst>
-          </p:cNvPr>
-          <p:cNvCxnSpPr>
-            <a:cxnSpLocks/>
-            <a:stCxn id="5" idx="0"/>
-            <a:endCxn id="8" idx="2"/>
-          </p:cNvCxnSpPr>
-          <p:nvPr/>
-        </p:nvCxnSpPr>
-        <p:spPr>
-          <a:xfrm flipV="1">
-            <a:off x="6843751" y="2765810"/>
-            <a:ext cx="0" cy="189965"/>
-          </a:xfrm>
-          <a:prstGeom prst="straightConnector1">
-            <a:avLst/>
-          </a:prstGeom>
-          <a:ln>
-            <a:tailEnd type="triangle"/>
-          </a:ln>
-        </p:spPr>
-        <p:style>
-          <a:lnRef idx="2">
-            <a:schemeClr val="dk1"/>
-          </a:lnRef>
-          <a:fillRef idx="1">
-            <a:schemeClr val="lt1"/>
-          </a:fillRef>
-          <a:effectRef idx="0">
-            <a:schemeClr val="dk1"/>
-          </a:effectRef>
-          <a:fontRef idx="minor">
-            <a:schemeClr val="dk1"/>
-          </a:fontRef>
-        </p:style>
-      </p:cxnSp>
-      <p:sp>
-        <p:nvSpPr>
-          <p:cNvPr id="44" name="Rounded Rectangle 43">
-            <a:extLst>
-              <a:ext uri="{FF2B5EF4-FFF2-40B4-BE49-F238E27FC236}">
-                <a16:creationId xmlns:a16="http://schemas.microsoft.com/office/drawing/2014/main" id="{987B597D-E1C3-6009-60FD-B1FE714DCF93}"/>
-              </a:ext>
-            </a:extLst>
-          </p:cNvPr>
-          <p:cNvSpPr/>
-          <p:nvPr/>
-        </p:nvSpPr>
-        <p:spPr>
-          <a:xfrm>
-            <a:off x="3606330" y="4092187"/>
-            <a:ext cx="1615151" cy="379930"/>
-          </a:xfrm>
-          <a:prstGeom prst="roundRect">
-            <a:avLst/>
-          </a:prstGeom>
-        </p:spPr>
-        <p:style>
-          <a:lnRef idx="2">
-            <a:schemeClr val="dk1"/>
-          </a:lnRef>
-          <a:fillRef idx="1">
-            <a:schemeClr val="lt1"/>
-          </a:fillRef>
-          <a:effectRef idx="0">
-            <a:schemeClr val="dk1"/>
-          </a:effectRef>
-          <a:fontRef idx="minor">
-            <a:schemeClr val="dk1"/>
-          </a:fontRef>
-        </p:style>
-        <p:txBody>
-          <a:bodyPr rtlCol="0" anchor="ctr"/>
+        <p:txBody>
+          <a:bodyPr rtlCol="0" anchor="t"/>
           <a:lstStyle/>
           <a:p>
-            <a:pPr algn="ctr"/>
+            <a:r>
+              <a:rPr lang="en-US" sz="800" dirty="0"/>
+              <a:t>g</a:t>
+            </a:r>
             <a:r>
               <a:rPr lang="en-TW" sz="800" dirty="0"/>
-              <a:t>Compose</a:t>
-            </a:r>
-          </a:p>
-        </p:txBody>
-      </p:sp>
-      <p:cxnSp>
-        <p:nvCxnSpPr>
-          <p:cNvPr id="48" name="Curved Connector 47">
-            <a:extLst>
-              <a:ext uri="{FF2B5EF4-FFF2-40B4-BE49-F238E27FC236}">
-                <a16:creationId xmlns:a16="http://schemas.microsoft.com/office/drawing/2014/main" id="{751CA2D0-6BEA-FEB9-1CE5-E121F45A470F}"/>
-              </a:ext>
-            </a:extLst>
-          </p:cNvPr>
-          <p:cNvCxnSpPr>
-            <a:cxnSpLocks/>
-            <a:stCxn id="44" idx="1"/>
-            <a:endCxn id="6" idx="1"/>
-          </p:cNvCxnSpPr>
-          <p:nvPr/>
-        </p:nvCxnSpPr>
-        <p:spPr>
-          <a:xfrm rot="10800000">
-            <a:off x="3580692" y="2575846"/>
-            <a:ext cx="25638" cy="1706307"/>
-          </a:xfrm>
-          <a:prstGeom prst="curvedConnector3">
-            <a:avLst>
-              <a:gd name="adj1" fmla="val 991645"/>
-            </a:avLst>
-          </a:prstGeom>
-          <a:ln>
-            <a:prstDash val="dash"/>
-          </a:ln>
-        </p:spPr>
-        <p:style>
-          <a:lnRef idx="1">
-            <a:schemeClr val="dk1"/>
-          </a:lnRef>
-          <a:fillRef idx="0">
-            <a:schemeClr val="dk1"/>
-          </a:fillRef>
-          <a:effectRef idx="0">
-            <a:schemeClr val="dk1"/>
-          </a:effectRef>
-          <a:fontRef idx="minor">
-            <a:schemeClr val="tx1"/>
-          </a:fontRef>
-        </p:style>
-      </p:cxnSp>
-      <p:cxnSp>
-        <p:nvCxnSpPr>
-          <p:cNvPr id="52" name="Curved Connector 51">
-            <a:extLst>
-              <a:ext uri="{FF2B5EF4-FFF2-40B4-BE49-F238E27FC236}">
-                <a16:creationId xmlns:a16="http://schemas.microsoft.com/office/drawing/2014/main" id="{F299692F-9736-2E46-5C9C-31331C48C250}"/>
-              </a:ext>
-            </a:extLst>
-          </p:cNvPr>
-          <p:cNvCxnSpPr>
-            <a:cxnSpLocks/>
-            <a:stCxn id="44" idx="3"/>
-            <a:endCxn id="7" idx="3"/>
-          </p:cNvCxnSpPr>
-          <p:nvPr/>
-        </p:nvCxnSpPr>
-        <p:spPr>
-          <a:xfrm flipV="1">
-            <a:off x="5221481" y="2575845"/>
-            <a:ext cx="12700" cy="1706307"/>
-          </a:xfrm>
-          <a:prstGeom prst="curvedConnector3">
-            <a:avLst>
-              <a:gd name="adj1" fmla="val 1800000"/>
-            </a:avLst>
-          </a:prstGeom>
-          <a:ln>
-            <a:prstDash val="dash"/>
-          </a:ln>
-        </p:spPr>
-        <p:style>
-          <a:lnRef idx="1">
-            <a:schemeClr val="dk1"/>
-          </a:lnRef>
-          <a:fillRef idx="0">
-            <a:schemeClr val="dk1"/>
-          </a:fillRef>
-          <a:effectRef idx="0">
-            <a:schemeClr val="dk1"/>
-          </a:effectRef>
-          <a:fontRef idx="minor">
-            <a:schemeClr val="tx1"/>
-          </a:fontRef>
-        </p:style>
-      </p:cxnSp>
+              <a:t>h auth login</a:t>
+            </a:r>
+          </a:p>
+          <a:p>
+            <a:r>
+              <a:rPr lang="en-US" sz="800" dirty="0"/>
+              <a:t>g</a:t>
+            </a:r>
+            <a:r>
+              <a:rPr lang="en-TW" sz="800" dirty="0"/>
+              <a:t>it status</a:t>
+            </a:r>
+          </a:p>
+          <a:p>
+            <a:r>
+              <a:rPr lang="en-US" sz="800" dirty="0"/>
+              <a:t>winget install --id git.git -e --source winget</a:t>
+            </a:r>
+          </a:p>
+          <a:p>
+            <a:r>
+              <a:rPr lang="en-US" sz="800" dirty="0"/>
+              <a:t>winget install --id github.cli -e --source winget</a:t>
+            </a:r>
+          </a:p>
+          <a:p>
+            <a:r>
+              <a:rPr lang="en-US" sz="800" dirty="0"/>
+              <a:t>git  --version</a:t>
+            </a:r>
+          </a:p>
+          <a:p>
+            <a:r>
+              <a:rPr lang="en-US" sz="800" dirty="0"/>
+              <a:t>gh --version</a:t>
+            </a:r>
+          </a:p>
+        </p:txBody>
+      </p:sp>
     </p:spTree>
     <p:extLst>
       <p:ext uri="{BB962C8B-B14F-4D97-AF65-F5344CB8AC3E}">
-        <p14:creationId xmlns:p14="http://schemas.microsoft.com/office/powerpoint/2010/main" val="1572480018"/>
+        <p14:creationId xmlns:p14="http://schemas.microsoft.com/office/powerpoint/2010/main" val="885993229"/>
       </p:ext>
     </p:extLst>
   </p:cSld>

</xml_diff>

<commit_message>
docs: added article for SSH
</commit_message>
<xml_diff>
--- a/kkraman02_github_io_ppt.pptx
+++ b/kkraman02_github_io_ppt.pptx
@@ -7,6 +7,7 @@
   <p:sldIdLst>
     <p:sldId id="256" r:id="rId2"/>
     <p:sldId id="257" r:id="rId3"/>
+    <p:sldId id="258" r:id="rId4"/>
   </p:sldIdLst>
   <p:sldSz cx="12192000" cy="6858000"/>
   <p:notesSz cx="6858000" cy="9144000"/>
@@ -262,7 +263,7 @@
           <a:p>
             <a:fld id="{133A8F66-8746-1246-B91D-4C57C954E106}" type="datetimeFigureOut">
               <a:rPr lang="en-TW" smtClean="0"/>
-              <a:t>2025/2/3</a:t>
+              <a:t>2025/2/16</a:t>
             </a:fld>
             <a:endParaRPr lang="en-TW"/>
           </a:p>
@@ -462,7 +463,7 @@
           <a:p>
             <a:fld id="{133A8F66-8746-1246-B91D-4C57C954E106}" type="datetimeFigureOut">
               <a:rPr lang="en-TW" smtClean="0"/>
-              <a:t>2025/2/3</a:t>
+              <a:t>2025/2/16</a:t>
             </a:fld>
             <a:endParaRPr lang="en-TW"/>
           </a:p>
@@ -672,7 +673,7 @@
           <a:p>
             <a:fld id="{133A8F66-8746-1246-B91D-4C57C954E106}" type="datetimeFigureOut">
               <a:rPr lang="en-TW" smtClean="0"/>
-              <a:t>2025/2/3</a:t>
+              <a:t>2025/2/16</a:t>
             </a:fld>
             <a:endParaRPr lang="en-TW"/>
           </a:p>
@@ -872,7 +873,7 @@
           <a:p>
             <a:fld id="{133A8F66-8746-1246-B91D-4C57C954E106}" type="datetimeFigureOut">
               <a:rPr lang="en-TW" smtClean="0"/>
-              <a:t>2025/2/3</a:t>
+              <a:t>2025/2/16</a:t>
             </a:fld>
             <a:endParaRPr lang="en-TW"/>
           </a:p>
@@ -1148,7 +1149,7 @@
           <a:p>
             <a:fld id="{133A8F66-8746-1246-B91D-4C57C954E106}" type="datetimeFigureOut">
               <a:rPr lang="en-TW" smtClean="0"/>
-              <a:t>2025/2/3</a:t>
+              <a:t>2025/2/16</a:t>
             </a:fld>
             <a:endParaRPr lang="en-TW"/>
           </a:p>
@@ -1416,7 +1417,7 @@
           <a:p>
             <a:fld id="{133A8F66-8746-1246-B91D-4C57C954E106}" type="datetimeFigureOut">
               <a:rPr lang="en-TW" smtClean="0"/>
-              <a:t>2025/2/3</a:t>
+              <a:t>2025/2/16</a:t>
             </a:fld>
             <a:endParaRPr lang="en-TW"/>
           </a:p>
@@ -1831,7 +1832,7 @@
           <a:p>
             <a:fld id="{133A8F66-8746-1246-B91D-4C57C954E106}" type="datetimeFigureOut">
               <a:rPr lang="en-TW" smtClean="0"/>
-              <a:t>2025/2/3</a:t>
+              <a:t>2025/2/16</a:t>
             </a:fld>
             <a:endParaRPr lang="en-TW"/>
           </a:p>
@@ -1973,7 +1974,7 @@
           <a:p>
             <a:fld id="{133A8F66-8746-1246-B91D-4C57C954E106}" type="datetimeFigureOut">
               <a:rPr lang="en-TW" smtClean="0"/>
-              <a:t>2025/2/3</a:t>
+              <a:t>2025/2/16</a:t>
             </a:fld>
             <a:endParaRPr lang="en-TW"/>
           </a:p>
@@ -2086,7 +2087,7 @@
           <a:p>
             <a:fld id="{133A8F66-8746-1246-B91D-4C57C954E106}" type="datetimeFigureOut">
               <a:rPr lang="en-TW" smtClean="0"/>
-              <a:t>2025/2/3</a:t>
+              <a:t>2025/2/16</a:t>
             </a:fld>
             <a:endParaRPr lang="en-TW"/>
           </a:p>
@@ -2399,7 +2400,7 @@
           <a:p>
             <a:fld id="{133A8F66-8746-1246-B91D-4C57C954E106}" type="datetimeFigureOut">
               <a:rPr lang="en-TW" smtClean="0"/>
-              <a:t>2025/2/3</a:t>
+              <a:t>2025/2/16</a:t>
             </a:fld>
             <a:endParaRPr lang="en-TW"/>
           </a:p>
@@ -2688,7 +2689,7 @@
           <a:p>
             <a:fld id="{133A8F66-8746-1246-B91D-4C57C954E106}" type="datetimeFigureOut">
               <a:rPr lang="en-TW" smtClean="0"/>
-              <a:t>2025/2/3</a:t>
+              <a:t>2025/2/16</a:t>
             </a:fld>
             <a:endParaRPr lang="en-TW"/>
           </a:p>
@@ -2931,7 +2932,7 @@
           <a:p>
             <a:fld id="{133A8F66-8746-1246-B91D-4C57C954E106}" type="datetimeFigureOut">
               <a:rPr lang="en-TW" smtClean="0"/>
-              <a:t>2025/2/3</a:t>
+              <a:t>2025/2/16</a:t>
             </a:fld>
             <a:endParaRPr lang="en-TW"/>
           </a:p>
@@ -4953,6 +4954,66 @@
 </p:sld>
 </file>
 
+<file path=ppt/slides/slide3.xml><?xml version="1.0" encoding="utf-8"?>
+<p:sld xmlns:a="http://schemas.openxmlformats.org/drawingml/2006/main" xmlns:r="http://schemas.openxmlformats.org/officeDocument/2006/relationships" xmlns:p="http://schemas.openxmlformats.org/presentationml/2006/main">
+  <p:cSld>
+    <p:spTree>
+      <p:nvGrpSpPr>
+        <p:cNvPr id="1" name=""/>
+        <p:cNvGrpSpPr/>
+        <p:nvPr/>
+      </p:nvGrpSpPr>
+      <p:grpSpPr>
+        <a:xfrm>
+          <a:off x="0" y="0"/>
+          <a:ext cx="0" cy="0"/>
+          <a:chOff x="0" y="0"/>
+          <a:chExt cx="0" cy="0"/>
+        </a:xfrm>
+      </p:grpSpPr>
+      <p:pic>
+        <p:nvPicPr>
+          <p:cNvPr id="3" name="Picture 2" descr="A screenshot of a phone&#10;&#10;Description automatically generated">
+            <a:extLst>
+              <a:ext uri="{FF2B5EF4-FFF2-40B4-BE49-F238E27FC236}">
+                <a16:creationId xmlns:a16="http://schemas.microsoft.com/office/drawing/2014/main" id="{4CEFD8EF-8D24-DD14-3FEA-B2F23CA61CA2}"/>
+              </a:ext>
+            </a:extLst>
+          </p:cNvPr>
+          <p:cNvPicPr>
+            <a:picLocks noChangeAspect="1"/>
+          </p:cNvPicPr>
+          <p:nvPr/>
+        </p:nvPicPr>
+        <p:blipFill>
+          <a:blip r:embed="rId2"/>
+          <a:stretch>
+            <a:fillRect/>
+          </a:stretch>
+        </p:blipFill>
+        <p:spPr>
+          <a:xfrm>
+            <a:off x="1993751" y="2023334"/>
+            <a:ext cx="7772400" cy="1727199"/>
+          </a:xfrm>
+          <a:prstGeom prst="rect">
+            <a:avLst/>
+          </a:prstGeom>
+        </p:spPr>
+      </p:pic>
+    </p:spTree>
+    <p:extLst>
+      <p:ext uri="{BB962C8B-B14F-4D97-AF65-F5344CB8AC3E}">
+        <p14:creationId xmlns:p14="http://schemas.microsoft.com/office/powerpoint/2010/main" val="828777541"/>
+      </p:ext>
+    </p:extLst>
+  </p:cSld>
+  <p:clrMapOvr>
+    <a:masterClrMapping/>
+  </p:clrMapOvr>
+</p:sld>
+</file>
+
 <file path=ppt/theme/theme1.xml><?xml version="1.0" encoding="utf-8"?>
 <a:theme xmlns:a="http://schemas.openxmlformats.org/drawingml/2006/main" name="Office Theme">
   <a:themeElements>

</xml_diff>